<commit_message>
Had uncommited files from the 3rd assignment
</commit_message>
<xml_diff>
--- a/TP3/presentation/Presentation.pptx
+++ b/TP3/presentation/Presentation.pptx
@@ -5,32 +5,34 @@
     <p:sldMasterId id="2147483659" r:id="rId1"/>
   </p:sldMasterIdLst>
   <p:notesMasterIdLst>
-    <p:notesMasterId r:id="rId13"/>
+    <p:notesMasterId r:id="rId15"/>
   </p:notesMasterIdLst>
   <p:sldIdLst>
     <p:sldId id="282" r:id="rId2"/>
     <p:sldId id="283" r:id="rId3"/>
     <p:sldId id="289" r:id="rId4"/>
-    <p:sldId id="284" r:id="rId5"/>
-    <p:sldId id="288" r:id="rId6"/>
-    <p:sldId id="287" r:id="rId7"/>
-    <p:sldId id="293" r:id="rId8"/>
-    <p:sldId id="292" r:id="rId9"/>
-    <p:sldId id="286" r:id="rId10"/>
-    <p:sldId id="291" r:id="rId11"/>
-    <p:sldId id="290" r:id="rId12"/>
+    <p:sldId id="294" r:id="rId5"/>
+    <p:sldId id="284" r:id="rId6"/>
+    <p:sldId id="288" r:id="rId7"/>
+    <p:sldId id="287" r:id="rId8"/>
+    <p:sldId id="293" r:id="rId9"/>
+    <p:sldId id="292" r:id="rId10"/>
+    <p:sldId id="286" r:id="rId11"/>
+    <p:sldId id="291" r:id="rId12"/>
+    <p:sldId id="290" r:id="rId13"/>
+    <p:sldId id="295" r:id="rId14"/>
   </p:sldIdLst>
   <p:sldSz cx="13004800" cy="9753600"/>
   <p:notesSz cx="6858000" cy="9144000"/>
   <p:embeddedFontLst>
     <p:embeddedFont>
       <p:font typeface="Gill Sans" panose="020B0604020202020204" charset="0"/>
-      <p:regular r:id="rId14"/>
-      <p:bold r:id="rId15"/>
+      <p:regular r:id="rId16"/>
+      <p:bold r:id="rId17"/>
     </p:embeddedFont>
     <p:embeddedFont>
       <p:font typeface="Cambria Math" panose="02040503050406030204" pitchFamily="18" charset="0"/>
-      <p:regular r:id="rId16"/>
+      <p:regular r:id="rId18"/>
     </p:embeddedFont>
   </p:embeddedFontLst>
   <p:defaultTextStyle>
@@ -243,6 +245,10 @@
 </p:presentation>
 </file>
 
+<file path=ppt/revisionInfo.xml><?xml version="1.0" encoding="utf-8"?>
+<p1510:revInfo xmlns:a="http://schemas.openxmlformats.org/drawingml/2006/main" xmlns:r="http://schemas.openxmlformats.org/officeDocument/2006/relationships" xmlns:p1510="http://schemas.microsoft.com/office/powerpoint/2015/10/main"/>
+</file>
+
 <file path=ppt/notesMasters/notesMaster1.xml><?xml version="1.0" encoding="utf-8"?>
 <p:notesMaster xmlns:a="http://schemas.openxmlformats.org/drawingml/2006/main" xmlns:r="http://schemas.openxmlformats.org/officeDocument/2006/relationships" xmlns:p="http://schemas.openxmlformats.org/presentationml/2006/main">
   <p:cSld>
@@ -624,13 +630,7 @@
           <a:p>
             <a:r>
               <a:rPr lang="en-GB" noProof="0" dirty="0"/>
-              <a:t>Initial Pre-processing to generate train and test datasets for each family; extract information from the provided files…</a:t>
-            </a:r>
-          </a:p>
-          <a:p>
-            <a:r>
-              <a:rPr lang="en-GB" noProof="0" dirty="0"/>
-              <a:t>Data Representation –&gt; Segmentation (to be detailed) ; 2 types of classifiers to be compared…</a:t>
+              <a:t>Protein Classification Problem – For any given protein determine its function by analysing its coding sequence; Proteins group into families according to their function, and we have 55 different functions – We developed and trained classifiers to detect proteins of each family: So 1 per family; in fact its 2 because we want to compare incremental and non-incremental approaches</a:t>
             </a:r>
           </a:p>
         </p:txBody>
@@ -638,7 +638,7 @@
     </p:spTree>
     <p:extLst>
       <p:ext uri="{BB962C8B-B14F-4D97-AF65-F5344CB8AC3E}">
-        <p14:creationId xmlns:p14="http://schemas.microsoft.com/office/powerpoint/2010/main" val="3422666410"/>
+        <p14:creationId xmlns:p14="http://schemas.microsoft.com/office/powerpoint/2010/main" val="3363781299"/>
       </p:ext>
     </p:extLst>
   </p:cSld>
@@ -694,7 +694,13 @@
           <a:p>
             <a:r>
               <a:rPr lang="en-GB" noProof="0" dirty="0"/>
-              <a:t>Best AUC – Hard-limit margin (Penalises a lot misclassifications)</a:t>
+              <a:t>Initial Pre-processing to generate train and test datasets for each family; extract information from the provided files…</a:t>
+            </a:r>
+          </a:p>
+          <a:p>
+            <a:r>
+              <a:rPr lang="en-GB" noProof="0" dirty="0"/>
+              <a:t>Data Representation –&gt; Segmentation (to be detailed) ; 2 types of classifiers to be compared…</a:t>
             </a:r>
           </a:p>
         </p:txBody>
@@ -702,7 +708,7 @@
     </p:spTree>
     <p:extLst>
       <p:ext uri="{BB962C8B-B14F-4D97-AF65-F5344CB8AC3E}">
-        <p14:creationId xmlns:p14="http://schemas.microsoft.com/office/powerpoint/2010/main" val="2377624713"/>
+        <p14:creationId xmlns:p14="http://schemas.microsoft.com/office/powerpoint/2010/main" val="3422666410"/>
       </p:ext>
     </p:extLst>
   </p:cSld>
@@ -756,141 +762,14 @@
           <a:bodyPr/>
           <a:lstStyle/>
           <a:p>
-            <a:r>
-              <a:rPr lang="pt-PT" dirty="0" err="1"/>
-              <a:t>Best</a:t>
-            </a:r>
-            <a:r>
-              <a:rPr lang="pt-PT" dirty="0"/>
-              <a:t> AUC – </a:t>
-            </a:r>
-            <a:r>
-              <a:rPr lang="pt-PT" dirty="0" err="1"/>
-              <a:t>Only</a:t>
-            </a:r>
-            <a:r>
-              <a:rPr lang="pt-PT" dirty="0"/>
-              <a:t> </a:t>
-            </a:r>
-            <a:r>
-              <a:rPr lang="pt-PT" dirty="0" err="1"/>
-              <a:t>the</a:t>
-            </a:r>
-            <a:r>
-              <a:rPr lang="pt-PT" dirty="0"/>
-              <a:t> </a:t>
-            </a:r>
-            <a:r>
-              <a:rPr lang="pt-PT" dirty="0" err="1"/>
-              <a:t>last</a:t>
-            </a:r>
-            <a:r>
-              <a:rPr lang="pt-PT" dirty="0"/>
-              <a:t> </a:t>
-            </a:r>
-            <a:r>
-              <a:rPr lang="pt-PT" dirty="0" err="1"/>
-              <a:t>one</a:t>
-            </a:r>
-            <a:r>
-              <a:rPr lang="pt-PT" dirty="0"/>
-              <a:t> </a:t>
-            </a:r>
-            <a:r>
-              <a:rPr lang="pt-PT" dirty="0" err="1"/>
-              <a:t>is</a:t>
-            </a:r>
-            <a:r>
-              <a:rPr lang="pt-PT" dirty="0"/>
-              <a:t> hard-</a:t>
-            </a:r>
-            <a:r>
-              <a:rPr lang="pt-PT" dirty="0" err="1"/>
-              <a:t>limit</a:t>
-            </a:r>
-            <a:r>
-              <a:rPr lang="pt-PT" dirty="0"/>
-              <a:t> (</a:t>
-            </a:r>
-            <a:r>
-              <a:rPr lang="pt-PT" dirty="0" err="1"/>
-              <a:t>or</a:t>
-            </a:r>
-            <a:r>
-              <a:rPr lang="pt-PT" dirty="0"/>
-              <a:t> </a:t>
-            </a:r>
-            <a:r>
-              <a:rPr lang="pt-PT" dirty="0" err="1"/>
-              <a:t>at</a:t>
-            </a:r>
-            <a:r>
-              <a:rPr lang="pt-PT" dirty="0"/>
-              <a:t> </a:t>
-            </a:r>
-            <a:r>
-              <a:rPr lang="pt-PT" dirty="0" err="1"/>
-              <a:t>least</a:t>
-            </a:r>
-            <a:r>
-              <a:rPr lang="pt-PT" dirty="0"/>
-              <a:t> </a:t>
-            </a:r>
-            <a:r>
-              <a:rPr lang="pt-PT" dirty="0" err="1"/>
-              <a:t>is</a:t>
-            </a:r>
-            <a:r>
-              <a:rPr lang="pt-PT" dirty="0"/>
-              <a:t> </a:t>
-            </a:r>
-            <a:r>
-              <a:rPr lang="pt-PT" dirty="0" err="1"/>
-              <a:t>considerably</a:t>
-            </a:r>
-            <a:r>
-              <a:rPr lang="pt-PT" dirty="0"/>
-              <a:t> more hard-</a:t>
-            </a:r>
-            <a:r>
-              <a:rPr lang="pt-PT" dirty="0" err="1"/>
-              <a:t>limit</a:t>
-            </a:r>
-            <a:r>
-              <a:rPr lang="pt-PT" dirty="0"/>
-              <a:t> </a:t>
-            </a:r>
-            <a:r>
-              <a:rPr lang="pt-PT" dirty="0" err="1"/>
-              <a:t>than</a:t>
-            </a:r>
-            <a:r>
-              <a:rPr lang="pt-PT" dirty="0"/>
-              <a:t> </a:t>
-            </a:r>
-            <a:r>
-              <a:rPr lang="pt-PT" dirty="0" err="1"/>
-              <a:t>the</a:t>
-            </a:r>
-            <a:r>
-              <a:rPr lang="pt-PT" dirty="0"/>
-              <a:t> </a:t>
-            </a:r>
-            <a:r>
-              <a:rPr lang="pt-PT" dirty="0" err="1"/>
-              <a:t>others</a:t>
-            </a:r>
-            <a:r>
-              <a:rPr lang="pt-PT" dirty="0"/>
-              <a:t>)</a:t>
-            </a:r>
+            <a:endParaRPr lang="en-GB" noProof="0" dirty="0"/>
           </a:p>
         </p:txBody>
       </p:sp>
     </p:spTree>
     <p:extLst>
       <p:ext uri="{BB962C8B-B14F-4D97-AF65-F5344CB8AC3E}">
-        <p14:creationId xmlns:p14="http://schemas.microsoft.com/office/powerpoint/2010/main" val="2690905255"/>
+        <p14:creationId xmlns:p14="http://schemas.microsoft.com/office/powerpoint/2010/main" val="2856681896"/>
       </p:ext>
     </p:extLst>
   </p:cSld>
@@ -946,7 +825,7 @@
           <a:p>
             <a:r>
               <a:rPr lang="en-GB" noProof="0" dirty="0"/>
-              <a:t>No overfit in LASVM – Can be explained by LASVM’s incremental training mechanisms</a:t>
+              <a:t>Best AUC – Hard-limit margin (Penalises a lot misclassifications)</a:t>
             </a:r>
           </a:p>
         </p:txBody>
@@ -954,7 +833,7 @@
     </p:spTree>
     <p:extLst>
       <p:ext uri="{BB962C8B-B14F-4D97-AF65-F5344CB8AC3E}">
-        <p14:creationId xmlns:p14="http://schemas.microsoft.com/office/powerpoint/2010/main" val="2635261549"/>
+        <p14:creationId xmlns:p14="http://schemas.microsoft.com/office/powerpoint/2010/main" val="2377624713"/>
       </p:ext>
     </p:extLst>
   </p:cSld>
@@ -1009,6 +888,258 @@
           <a:lstStyle/>
           <a:p>
             <a:r>
+              <a:rPr lang="pt-PT" dirty="0" err="1"/>
+              <a:t>Best</a:t>
+            </a:r>
+            <a:r>
+              <a:rPr lang="pt-PT" dirty="0"/>
+              <a:t> AUC – </a:t>
+            </a:r>
+            <a:r>
+              <a:rPr lang="pt-PT" dirty="0" err="1"/>
+              <a:t>Only</a:t>
+            </a:r>
+            <a:r>
+              <a:rPr lang="pt-PT" dirty="0"/>
+              <a:t> </a:t>
+            </a:r>
+            <a:r>
+              <a:rPr lang="pt-PT" dirty="0" err="1"/>
+              <a:t>the</a:t>
+            </a:r>
+            <a:r>
+              <a:rPr lang="pt-PT" dirty="0"/>
+              <a:t> </a:t>
+            </a:r>
+            <a:r>
+              <a:rPr lang="pt-PT" dirty="0" err="1"/>
+              <a:t>last</a:t>
+            </a:r>
+            <a:r>
+              <a:rPr lang="pt-PT" dirty="0"/>
+              <a:t> </a:t>
+            </a:r>
+            <a:r>
+              <a:rPr lang="pt-PT" dirty="0" err="1"/>
+              <a:t>one</a:t>
+            </a:r>
+            <a:r>
+              <a:rPr lang="pt-PT" dirty="0"/>
+              <a:t> </a:t>
+            </a:r>
+            <a:r>
+              <a:rPr lang="pt-PT" dirty="0" err="1"/>
+              <a:t>is</a:t>
+            </a:r>
+            <a:r>
+              <a:rPr lang="pt-PT" dirty="0"/>
+              <a:t> hard-</a:t>
+            </a:r>
+            <a:r>
+              <a:rPr lang="pt-PT" dirty="0" err="1"/>
+              <a:t>limit</a:t>
+            </a:r>
+            <a:r>
+              <a:rPr lang="pt-PT" dirty="0"/>
+              <a:t> (</a:t>
+            </a:r>
+            <a:r>
+              <a:rPr lang="pt-PT" dirty="0" err="1"/>
+              <a:t>or</a:t>
+            </a:r>
+            <a:r>
+              <a:rPr lang="pt-PT" dirty="0"/>
+              <a:t> </a:t>
+            </a:r>
+            <a:r>
+              <a:rPr lang="pt-PT" dirty="0" err="1"/>
+              <a:t>at</a:t>
+            </a:r>
+            <a:r>
+              <a:rPr lang="pt-PT" dirty="0"/>
+              <a:t> </a:t>
+            </a:r>
+            <a:r>
+              <a:rPr lang="pt-PT" dirty="0" err="1"/>
+              <a:t>least</a:t>
+            </a:r>
+            <a:r>
+              <a:rPr lang="pt-PT" dirty="0"/>
+              <a:t> </a:t>
+            </a:r>
+            <a:r>
+              <a:rPr lang="pt-PT" dirty="0" err="1"/>
+              <a:t>is</a:t>
+            </a:r>
+            <a:r>
+              <a:rPr lang="pt-PT" dirty="0"/>
+              <a:t> </a:t>
+            </a:r>
+            <a:r>
+              <a:rPr lang="pt-PT" dirty="0" err="1"/>
+              <a:t>considerably</a:t>
+            </a:r>
+            <a:r>
+              <a:rPr lang="pt-PT" dirty="0"/>
+              <a:t> more hard-</a:t>
+            </a:r>
+            <a:r>
+              <a:rPr lang="pt-PT" dirty="0" err="1"/>
+              <a:t>limit</a:t>
+            </a:r>
+            <a:r>
+              <a:rPr lang="pt-PT" dirty="0"/>
+              <a:t> </a:t>
+            </a:r>
+            <a:r>
+              <a:rPr lang="pt-PT" dirty="0" err="1"/>
+              <a:t>than</a:t>
+            </a:r>
+            <a:r>
+              <a:rPr lang="pt-PT" dirty="0"/>
+              <a:t> </a:t>
+            </a:r>
+            <a:r>
+              <a:rPr lang="pt-PT" dirty="0" err="1"/>
+              <a:t>the</a:t>
+            </a:r>
+            <a:r>
+              <a:rPr lang="pt-PT" dirty="0"/>
+              <a:t> </a:t>
+            </a:r>
+            <a:r>
+              <a:rPr lang="pt-PT" dirty="0" err="1"/>
+              <a:t>others</a:t>
+            </a:r>
+            <a:r>
+              <a:rPr lang="pt-PT" dirty="0"/>
+              <a:t>)</a:t>
+            </a:r>
+          </a:p>
+        </p:txBody>
+      </p:sp>
+    </p:spTree>
+    <p:extLst>
+      <p:ext uri="{BB962C8B-B14F-4D97-AF65-F5344CB8AC3E}">
+        <p14:creationId xmlns:p14="http://schemas.microsoft.com/office/powerpoint/2010/main" val="2690905255"/>
+      </p:ext>
+    </p:extLst>
+  </p:cSld>
+  <p:clrMapOvr>
+    <a:masterClrMapping/>
+  </p:clrMapOvr>
+</p:notes>
+</file>
+
+<file path=ppt/notesSlides/notesSlide6.xml><?xml version="1.0" encoding="utf-8"?>
+<p:notes xmlns:a="http://schemas.openxmlformats.org/drawingml/2006/main" xmlns:r="http://schemas.openxmlformats.org/officeDocument/2006/relationships" xmlns:p="http://schemas.openxmlformats.org/presentationml/2006/main">
+  <p:cSld>
+    <p:spTree>
+      <p:nvGrpSpPr>
+        <p:cNvPr id="1" name=""/>
+        <p:cNvGrpSpPr/>
+        <p:nvPr/>
+      </p:nvGrpSpPr>
+      <p:grpSpPr>
+        <a:xfrm>
+          <a:off x="0" y="0"/>
+          <a:ext cx="0" cy="0"/>
+          <a:chOff x="0" y="0"/>
+          <a:chExt cx="0" cy="0"/>
+        </a:xfrm>
+      </p:grpSpPr>
+      <p:sp>
+        <p:nvSpPr>
+          <p:cNvPr id="2" name="Marcador de Posição da Imagem do Diapositivo 1"/>
+          <p:cNvSpPr>
+            <a:spLocks noGrp="1" noRot="1" noChangeAspect="1"/>
+          </p:cNvSpPr>
+          <p:nvPr>
+            <p:ph type="sldImg"/>
+          </p:nvPr>
+        </p:nvSpPr>
+        <p:spPr/>
+      </p:sp>
+      <p:sp>
+        <p:nvSpPr>
+          <p:cNvPr id="3" name="Marcador de Posição de Notas 2"/>
+          <p:cNvSpPr>
+            <a:spLocks noGrp="1"/>
+          </p:cNvSpPr>
+          <p:nvPr>
+            <p:ph type="body" idx="1"/>
+          </p:nvPr>
+        </p:nvSpPr>
+        <p:spPr/>
+        <p:txBody>
+          <a:bodyPr/>
+          <a:lstStyle/>
+          <a:p>
+            <a:r>
+              <a:rPr lang="en-GB" noProof="0" dirty="0"/>
+              <a:t>No overfit in LASVM – Can be explained by LASVM’s incremental training mechanisms</a:t>
+            </a:r>
+          </a:p>
+        </p:txBody>
+      </p:sp>
+    </p:spTree>
+    <p:extLst>
+      <p:ext uri="{BB962C8B-B14F-4D97-AF65-F5344CB8AC3E}">
+        <p14:creationId xmlns:p14="http://schemas.microsoft.com/office/powerpoint/2010/main" val="2635261549"/>
+      </p:ext>
+    </p:extLst>
+  </p:cSld>
+  <p:clrMapOvr>
+    <a:masterClrMapping/>
+  </p:clrMapOvr>
+</p:notes>
+</file>
+
+<file path=ppt/notesSlides/notesSlide7.xml><?xml version="1.0" encoding="utf-8"?>
+<p:notes xmlns:a="http://schemas.openxmlformats.org/drawingml/2006/main" xmlns:r="http://schemas.openxmlformats.org/officeDocument/2006/relationships" xmlns:p="http://schemas.openxmlformats.org/presentationml/2006/main">
+  <p:cSld>
+    <p:spTree>
+      <p:nvGrpSpPr>
+        <p:cNvPr id="1" name=""/>
+        <p:cNvGrpSpPr/>
+        <p:nvPr/>
+      </p:nvGrpSpPr>
+      <p:grpSpPr>
+        <a:xfrm>
+          <a:off x="0" y="0"/>
+          <a:ext cx="0" cy="0"/>
+          <a:chOff x="0" y="0"/>
+          <a:chExt cx="0" cy="0"/>
+        </a:xfrm>
+      </p:grpSpPr>
+      <p:sp>
+        <p:nvSpPr>
+          <p:cNvPr id="2" name="Marcador de Posição da Imagem do Diapositivo 1"/>
+          <p:cNvSpPr>
+            <a:spLocks noGrp="1" noRot="1" noChangeAspect="1"/>
+          </p:cNvSpPr>
+          <p:nvPr>
+            <p:ph type="sldImg"/>
+          </p:nvPr>
+        </p:nvSpPr>
+        <p:spPr/>
+      </p:sp>
+      <p:sp>
+        <p:nvSpPr>
+          <p:cNvPr id="3" name="Marcador de Posição de Notas 2"/>
+          <p:cNvSpPr>
+            <a:spLocks noGrp="1"/>
+          </p:cNvSpPr>
+          <p:nvPr>
+            <p:ph type="body" idx="1"/>
+          </p:nvPr>
+        </p:nvSpPr>
+        <p:spPr/>
+        <p:txBody>
+          <a:bodyPr/>
+          <a:lstStyle/>
+          <a:p>
+            <a:r>
               <a:rPr lang="en-GB" noProof="0" dirty="0"/>
               <a:t>Parameter fine tuning – More exhaustive search of the parameter space</a:t>
             </a:r>
@@ -1025,6 +1156,67 @@
     <p:extLst>
       <p:ext uri="{BB962C8B-B14F-4D97-AF65-F5344CB8AC3E}">
         <p14:creationId xmlns:p14="http://schemas.microsoft.com/office/powerpoint/2010/main" val="3851344250"/>
+      </p:ext>
+    </p:extLst>
+  </p:cSld>
+  <p:clrMapOvr>
+    <a:masterClrMapping/>
+  </p:clrMapOvr>
+</p:notes>
+</file>
+
+<file path=ppt/notesSlides/notesSlide8.xml><?xml version="1.0" encoding="utf-8"?>
+<p:notes xmlns:a="http://schemas.openxmlformats.org/drawingml/2006/main" xmlns:r="http://schemas.openxmlformats.org/officeDocument/2006/relationships" xmlns:p="http://schemas.openxmlformats.org/presentationml/2006/main">
+  <p:cSld>
+    <p:spTree>
+      <p:nvGrpSpPr>
+        <p:cNvPr id="1" name=""/>
+        <p:cNvGrpSpPr/>
+        <p:nvPr/>
+      </p:nvGrpSpPr>
+      <p:grpSpPr>
+        <a:xfrm>
+          <a:off x="0" y="0"/>
+          <a:ext cx="0" cy="0"/>
+          <a:chOff x="0" y="0"/>
+          <a:chExt cx="0" cy="0"/>
+        </a:xfrm>
+      </p:grpSpPr>
+      <p:sp>
+        <p:nvSpPr>
+          <p:cNvPr id="2" name="Marcador de Posição da Imagem do Diapositivo 1"/>
+          <p:cNvSpPr>
+            <a:spLocks noGrp="1" noRot="1" noChangeAspect="1"/>
+          </p:cNvSpPr>
+          <p:nvPr>
+            <p:ph type="sldImg"/>
+          </p:nvPr>
+        </p:nvSpPr>
+        <p:spPr/>
+      </p:sp>
+      <p:sp>
+        <p:nvSpPr>
+          <p:cNvPr id="3" name="Marcador de Posição de Notas 2"/>
+          <p:cNvSpPr>
+            <a:spLocks noGrp="1"/>
+          </p:cNvSpPr>
+          <p:nvPr>
+            <p:ph type="body" idx="1"/>
+          </p:nvPr>
+        </p:nvSpPr>
+        <p:spPr/>
+        <p:txBody>
+          <a:bodyPr/>
+          <a:lstStyle/>
+          <a:p>
+            <a:endParaRPr lang="en-GB" noProof="0" dirty="0"/>
+          </a:p>
+        </p:txBody>
+      </p:sp>
+    </p:spTree>
+    <p:extLst>
+      <p:ext uri="{BB962C8B-B14F-4D97-AF65-F5344CB8AC3E}">
+        <p14:creationId xmlns:p14="http://schemas.microsoft.com/office/powerpoint/2010/main" val="3686131918"/>
       </p:ext>
     </p:extLst>
   </p:cSld>
@@ -4048,7 +4240,7 @@
             </a:pPr>
             <a:r>
               <a:rPr lang="en-GB" sz="5400" dirty="0"/>
-              <a:t>Conclusions</a:t>
+              <a:t>LASVM - Results</a:t>
             </a:r>
           </a:p>
         </p:txBody>
@@ -4082,10 +4274,7 @@
           </a:bodyPr>
           <a:lstStyle/>
           <a:p>
-            <a:pPr marL="1071562" marR="0" lvl="0" indent="-538162" algn="just" rtl="0">
-              <a:lnSpc>
-                <a:spcPct val="100000"/>
-              </a:lnSpc>
+            <a:pPr marL="1071562" lvl="0" indent="-538162" algn="just">
               <a:spcBef>
                 <a:spcPts val="3700"/>
               </a:spcBef>
@@ -4095,42 +4284,84 @@
             </a:pPr>
             <a:r>
               <a:rPr lang="en-GB" dirty="0"/>
-              <a:t>LASVM produce better results than SVM and does not appear to suffer from overfitting</a:t>
-            </a:r>
-          </a:p>
-          <a:p>
-            <a:pPr marL="1071563" marR="0" lvl="0" indent="-537845" algn="just" rtl="0">
-              <a:lnSpc>
-                <a:spcPct val="100000"/>
-              </a:lnSpc>
+              <a:t>Average AUC of 0.81 in test dataset</a:t>
+            </a:r>
+          </a:p>
+          <a:p>
+            <a:pPr marL="1071562" lvl="0" indent="-538162" algn="just">
               <a:spcBef>
                 <a:spcPts val="3700"/>
               </a:spcBef>
-              <a:buSzPct val="98026"/>
+              <a:buSzPct val="98157"/>
               <a:buFont typeface="Arial"/>
               <a:buChar char="•"/>
             </a:pPr>
             <a:r>
               <a:rPr lang="en-GB" dirty="0"/>
-              <a:t>Best results in test dataset do not correspond to high performances in the training dataset (AUC = 0.7-0.8)</a:t>
-            </a:r>
-          </a:p>
-          <a:p>
-            <a:pPr marL="1071563" marR="0" lvl="0" indent="-537845" algn="just" rtl="0">
-              <a:lnSpc>
-                <a:spcPct val="100000"/>
-              </a:lnSpc>
+              <a:t>Best AUC = 0.99 in families “b.29.1._b.29.1.11.” (C = 32 ;</a:t>
+            </a:r>
+            <a:r>
+              <a:rPr lang="el-GR" dirty="0"/>
+              <a:t> γ</a:t>
+            </a:r>
+            <a:r>
+              <a:rPr lang="pt-PT" dirty="0"/>
+              <a:t> = 1.22e-04</a:t>
+            </a:r>
+            <a:r>
+              <a:rPr lang="en-GB" dirty="0"/>
+              <a:t>); “b.29.1._b.29.1.2.” (C = 4 ; </a:t>
+            </a:r>
+            <a:r>
+              <a:rPr lang="el-GR" dirty="0"/>
+              <a:t>γ</a:t>
+            </a:r>
+            <a:r>
+              <a:rPr lang="pt-PT" dirty="0"/>
+              <a:t> = 9.7e-04); </a:t>
+            </a:r>
+            <a:r>
+              <a:rPr lang="en-GB" dirty="0"/>
+              <a:t>and “c.67.1._c.67.1.4.” (C = 512 ; </a:t>
+            </a:r>
+            <a:r>
+              <a:rPr lang="el-GR" dirty="0"/>
+              <a:t>γ</a:t>
+            </a:r>
+            <a:r>
+              <a:rPr lang="pt-PT" dirty="0"/>
+              <a:t> = 2.44e-04)</a:t>
+            </a:r>
+            <a:endParaRPr lang="en-GB" dirty="0"/>
+          </a:p>
+          <a:p>
+            <a:pPr marL="1071562" lvl="0" indent="-538162" algn="just">
               <a:spcBef>
                 <a:spcPts val="3700"/>
               </a:spcBef>
-              <a:buSzPct val="98026"/>
+              <a:buSzPct val="98157"/>
               <a:buFont typeface="Arial"/>
               <a:buChar char="•"/>
             </a:pPr>
             <a:r>
               <a:rPr lang="en-GB" dirty="0"/>
-              <a:t>Average results lower than SCOP40 benchmark</a:t>
-            </a:r>
+              <a:t>Does not appear to suffer from overfitting</a:t>
+            </a:r>
+          </a:p>
+          <a:p>
+            <a:pPr marL="1071562" lvl="0" indent="-538162" algn="just">
+              <a:spcBef>
+                <a:spcPts val="3700"/>
+              </a:spcBef>
+              <a:buSzPct val="98157"/>
+              <a:buFont typeface="Arial"/>
+              <a:buChar char="•"/>
+            </a:pPr>
+            <a:r>
+              <a:rPr lang="en-GB" dirty="0"/>
+              <a:t>Families where no classifier could be learned (Train AUC = Test AUC around 0.5)</a:t>
+            </a:r>
+            <a:endParaRPr lang="pt-PT" dirty="0"/>
           </a:p>
         </p:txBody>
       </p:sp>
@@ -4272,7 +4503,7 @@
                 <a:cs typeface="Gill Sans"/>
                 <a:sym typeface="Gill Sans"/>
               </a:rPr>
-              <a:t>2</a:t>
+              <a:t>10</a:t>
             </a:r>
           </a:p>
         </p:txBody>
@@ -4280,7 +4511,7 @@
     </p:spTree>
     <p:extLst>
       <p:ext uri="{BB962C8B-B14F-4D97-AF65-F5344CB8AC3E}">
-        <p14:creationId xmlns:p14="http://schemas.microsoft.com/office/powerpoint/2010/main" val="1312205967"/>
+        <p14:creationId xmlns:p14="http://schemas.microsoft.com/office/powerpoint/2010/main" val="4003849053"/>
       </p:ext>
     </p:extLst>
   </p:cSld>
@@ -4345,7 +4576,7 @@
             </a:pPr>
             <a:r>
               <a:rPr lang="en-GB" sz="5400" dirty="0"/>
-              <a:t>Future Work</a:t>
+              <a:t>Conclusions</a:t>
             </a:r>
           </a:p>
         </p:txBody>
@@ -4392,7 +4623,7 @@
             </a:pPr>
             <a:r>
               <a:rPr lang="en-GB" dirty="0"/>
-              <a:t>Extend parameter fine tuning</a:t>
+              <a:t>LASVM produce better results than SVM and does not appear to suffer from overfitting</a:t>
             </a:r>
           </a:p>
           <a:p>
@@ -4409,7 +4640,7 @@
             </a:pPr>
             <a:r>
               <a:rPr lang="en-GB" dirty="0"/>
-              <a:t>Missing data imputation techniques</a:t>
+              <a:t>Best results in test dataset do not correspond to high performances in the training dataset (AUC = 0.7-0.8)</a:t>
             </a:r>
           </a:p>
           <a:p>
@@ -4426,24 +4657,7 @@
             </a:pPr>
             <a:r>
               <a:rPr lang="en-GB" dirty="0"/>
-              <a:t>More powerful representation techniques</a:t>
-            </a:r>
-          </a:p>
-          <a:p>
-            <a:pPr marL="1071563" marR="0" lvl="0" indent="-537845" algn="just" rtl="0">
-              <a:lnSpc>
-                <a:spcPct val="100000"/>
-              </a:lnSpc>
-              <a:spcBef>
-                <a:spcPts val="3700"/>
-              </a:spcBef>
-              <a:buSzPct val="98026"/>
-              <a:buFont typeface="Arial"/>
-              <a:buChar char="•"/>
-            </a:pPr>
-            <a:r>
-              <a:rPr lang="en-GB" dirty="0"/>
-              <a:t>Other machine learning techniques, such as neural networks or random forests</a:t>
+              <a:t>Average results lower than SCOP40 benchmark</a:t>
             </a:r>
           </a:p>
         </p:txBody>
@@ -4594,7 +4808,569 @@
     </p:spTree>
     <p:extLst>
       <p:ext uri="{BB962C8B-B14F-4D97-AF65-F5344CB8AC3E}">
+        <p14:creationId xmlns:p14="http://schemas.microsoft.com/office/powerpoint/2010/main" val="1312205967"/>
+      </p:ext>
+    </p:extLst>
+  </p:cSld>
+  <p:clrMapOvr>
+    <a:masterClrMapping/>
+  </p:clrMapOvr>
+</p:sld>
+</file>
+
+<file path=ppt/slides/slide12.xml><?xml version="1.0" encoding="utf-8"?>
+<p:sld xmlns:a="http://schemas.openxmlformats.org/drawingml/2006/main" xmlns:r="http://schemas.openxmlformats.org/officeDocument/2006/relationships" xmlns:p="http://schemas.openxmlformats.org/presentationml/2006/main">
+  <p:cSld>
+    <p:spTree>
+      <p:nvGrpSpPr>
+        <p:cNvPr id="1" name=""/>
+        <p:cNvGrpSpPr/>
+        <p:nvPr/>
+      </p:nvGrpSpPr>
+      <p:grpSpPr>
+        <a:xfrm>
+          <a:off x="0" y="0"/>
+          <a:ext cx="0" cy="0"/>
+          <a:chOff x="0" y="0"/>
+          <a:chExt cx="0" cy="0"/>
+        </a:xfrm>
+      </p:grpSpPr>
+      <p:sp>
+        <p:nvSpPr>
+          <p:cNvPr id="4" name="Shape 43"/>
+          <p:cNvSpPr txBox="1">
+            <a:spLocks noGrp="1"/>
+          </p:cNvSpPr>
+          <p:nvPr>
+            <p:ph type="title"/>
+          </p:nvPr>
+        </p:nvSpPr>
+        <p:spPr>
+          <a:xfrm>
+            <a:off x="355600" y="150125"/>
+            <a:ext cx="12293599" cy="1928125"/>
+          </a:xfrm>
+          <a:prstGeom prst="rect">
+            <a:avLst/>
+          </a:prstGeom>
+          <a:noFill/>
+          <a:ln>
+            <a:noFill/>
+          </a:ln>
+        </p:spPr>
+        <p:txBody>
+          <a:bodyPr lIns="0" tIns="0" rIns="0" bIns="0" anchor="ctr" anchorCtr="0">
+            <a:noAutofit/>
+          </a:bodyPr>
+          <a:lstStyle/>
+          <a:p>
+            <a:pPr marL="0" marR="0" lvl="0" indent="0" algn="ctr" rtl="0">
+              <a:spcBef>
+                <a:spcPts val="0"/>
+              </a:spcBef>
+              <a:buSzPct val="25000"/>
+              <a:buNone/>
+            </a:pPr>
+            <a:r>
+              <a:rPr lang="en-GB" sz="5400" dirty="0"/>
+              <a:t>Future Work</a:t>
+            </a:r>
+          </a:p>
+        </p:txBody>
+      </p:sp>
+      <p:sp>
+        <p:nvSpPr>
+          <p:cNvPr id="5" name="Shape 44"/>
+          <p:cNvSpPr txBox="1">
+            <a:spLocks noGrp="1"/>
+          </p:cNvSpPr>
+          <p:nvPr>
+            <p:ph type="body" idx="1"/>
+          </p:nvPr>
+        </p:nvSpPr>
+        <p:spPr>
+          <a:xfrm>
+            <a:off x="355600" y="2730500"/>
+            <a:ext cx="12293599" cy="6299200"/>
+          </a:xfrm>
+          <a:prstGeom prst="rect">
+            <a:avLst/>
+          </a:prstGeom>
+          <a:noFill/>
+          <a:ln>
+            <a:noFill/>
+          </a:ln>
+        </p:spPr>
+        <p:txBody>
+          <a:bodyPr lIns="0" tIns="0" rIns="0" bIns="0" anchor="t" anchorCtr="0">
+            <a:noAutofit/>
+          </a:bodyPr>
+          <a:lstStyle/>
+          <a:p>
+            <a:pPr marL="1071562" marR="0" lvl="0" indent="-538162" algn="just" rtl="0">
+              <a:lnSpc>
+                <a:spcPct val="100000"/>
+              </a:lnSpc>
+              <a:spcBef>
+                <a:spcPts val="3700"/>
+              </a:spcBef>
+              <a:buSzPct val="98157"/>
+              <a:buFont typeface="Arial"/>
+              <a:buChar char="•"/>
+            </a:pPr>
+            <a:r>
+              <a:rPr lang="en-GB" dirty="0"/>
+              <a:t>Extend parameter fine tuning</a:t>
+            </a:r>
+          </a:p>
+          <a:p>
+            <a:pPr marL="1071563" marR="0" lvl="0" indent="-537845" algn="just" rtl="0">
+              <a:lnSpc>
+                <a:spcPct val="100000"/>
+              </a:lnSpc>
+              <a:spcBef>
+                <a:spcPts val="3700"/>
+              </a:spcBef>
+              <a:buSzPct val="98026"/>
+              <a:buFont typeface="Arial"/>
+              <a:buChar char="•"/>
+            </a:pPr>
+            <a:r>
+              <a:rPr lang="en-GB" dirty="0"/>
+              <a:t>Missing data imputation techniques</a:t>
+            </a:r>
+          </a:p>
+          <a:p>
+            <a:pPr marL="1071563" marR="0" lvl="0" indent="-537845" algn="just" rtl="0">
+              <a:lnSpc>
+                <a:spcPct val="100000"/>
+              </a:lnSpc>
+              <a:spcBef>
+                <a:spcPts val="3700"/>
+              </a:spcBef>
+              <a:buSzPct val="98026"/>
+              <a:buFont typeface="Arial"/>
+              <a:buChar char="•"/>
+            </a:pPr>
+            <a:r>
+              <a:rPr lang="en-GB" dirty="0"/>
+              <a:t>More powerful representation techniques</a:t>
+            </a:r>
+          </a:p>
+          <a:p>
+            <a:pPr marL="1071563" marR="0" lvl="0" indent="-537845" algn="just" rtl="0">
+              <a:lnSpc>
+                <a:spcPct val="100000"/>
+              </a:lnSpc>
+              <a:spcBef>
+                <a:spcPts val="3700"/>
+              </a:spcBef>
+              <a:buSzPct val="98026"/>
+              <a:buFont typeface="Arial"/>
+              <a:buChar char="•"/>
+            </a:pPr>
+            <a:r>
+              <a:rPr lang="en-GB" dirty="0"/>
+              <a:t>Other machine learning techniques, such as neural networks or random forests</a:t>
+            </a:r>
+          </a:p>
+        </p:txBody>
+      </p:sp>
+      <p:pic>
+        <p:nvPicPr>
+          <p:cNvPr id="6" name="Shape 45"/>
+          <p:cNvPicPr preferRelativeResize="0"/>
+          <p:nvPr/>
+        </p:nvPicPr>
+        <p:blipFill rotWithShape="1">
+          <a:blip r:embed="rId3">
+            <a:alphaModFix/>
+          </a:blip>
+          <a:srcRect/>
+          <a:stretch/>
+        </p:blipFill>
+        <p:spPr>
+          <a:xfrm>
+            <a:off x="10566400" y="8579242"/>
+            <a:ext cx="2082800" cy="900915"/>
+          </a:xfrm>
+          <a:prstGeom prst="rect">
+            <a:avLst/>
+          </a:prstGeom>
+          <a:noFill/>
+          <a:ln>
+            <a:noFill/>
+          </a:ln>
+        </p:spPr>
+      </p:pic>
+      <p:sp>
+        <p:nvSpPr>
+          <p:cNvPr id="7" name="Shape 47"/>
+          <p:cNvSpPr txBox="1"/>
+          <p:nvPr/>
+        </p:nvSpPr>
+        <p:spPr>
+          <a:xfrm>
+            <a:off x="3874426" y="9131350"/>
+            <a:ext cx="5623800" cy="379500"/>
+          </a:xfrm>
+          <a:prstGeom prst="rect">
+            <a:avLst/>
+          </a:prstGeom>
+          <a:noFill/>
+          <a:ln>
+            <a:noFill/>
+          </a:ln>
+        </p:spPr>
+        <p:txBody>
+          <a:bodyPr lIns="50800" tIns="50800" rIns="50800" bIns="50800" anchor="ctr" anchorCtr="0">
+            <a:noAutofit/>
+          </a:bodyPr>
+          <a:lstStyle/>
+          <a:p>
+            <a:pPr marL="0" marR="0" lvl="0" indent="0" algn="ctr" rtl="0">
+              <a:spcBef>
+                <a:spcPts val="0"/>
+              </a:spcBef>
+              <a:buSzPct val="25000"/>
+              <a:buNone/>
+            </a:pPr>
+            <a:r>
+              <a:rPr lang="en-GB" sz="1800" b="0" i="0" u="none" strike="noStrike" cap="none" dirty="0">
+                <a:solidFill>
+                  <a:srgbClr val="535353"/>
+                </a:solidFill>
+                <a:latin typeface="Gill Sans"/>
+                <a:ea typeface="Gill Sans"/>
+                <a:cs typeface="Gill Sans"/>
+                <a:sym typeface="Gill Sans"/>
+              </a:rPr>
+              <a:t>Joaquim Leitão – R</a:t>
+            </a:r>
+            <a:r>
+              <a:rPr lang="en-GB" sz="1800" dirty="0">
+                <a:solidFill>
+                  <a:srgbClr val="535353"/>
+                </a:solidFill>
+                <a:latin typeface="Gill Sans"/>
+                <a:ea typeface="Gill Sans"/>
+                <a:cs typeface="Gill Sans"/>
+                <a:sym typeface="Gill Sans"/>
+              </a:rPr>
+              <a:t>eal Time Learning in Intelligent Systems</a:t>
+            </a:r>
+          </a:p>
+        </p:txBody>
+      </p:sp>
+      <p:sp>
+        <p:nvSpPr>
+          <p:cNvPr id="8" name="Shape 46"/>
+          <p:cNvSpPr txBox="1"/>
+          <p:nvPr/>
+        </p:nvSpPr>
+        <p:spPr>
+          <a:xfrm>
+            <a:off x="355600" y="9131343"/>
+            <a:ext cx="600892" cy="379591"/>
+          </a:xfrm>
+          <a:prstGeom prst="rect">
+            <a:avLst/>
+          </a:prstGeom>
+          <a:noFill/>
+          <a:ln>
+            <a:noFill/>
+          </a:ln>
+        </p:spPr>
+        <p:txBody>
+          <a:bodyPr lIns="50800" tIns="50800" rIns="50800" bIns="50800" anchor="ctr" anchorCtr="0">
+            <a:noAutofit/>
+          </a:bodyPr>
+          <a:lstStyle/>
+          <a:p>
+            <a:pPr marL="0" marR="0" lvl="0" indent="0" algn="ctr" rtl="0">
+              <a:lnSpc>
+                <a:spcPct val="100000"/>
+              </a:lnSpc>
+              <a:spcBef>
+                <a:spcPts val="0"/>
+              </a:spcBef>
+              <a:spcAft>
+                <a:spcPts val="0"/>
+              </a:spcAft>
+              <a:buClr>
+                <a:srgbClr val="535353"/>
+              </a:buClr>
+              <a:buSzPct val="25000"/>
+              <a:buFont typeface="Gill Sans"/>
+              <a:buNone/>
+            </a:pPr>
+            <a:r>
+              <a:rPr lang="en-GB" sz="1800" b="0" i="0" u="none" strike="noStrike" cap="none" dirty="0">
+                <a:solidFill>
+                  <a:srgbClr val="535353"/>
+                </a:solidFill>
+                <a:latin typeface="Gill Sans"/>
+                <a:ea typeface="Gill Sans"/>
+                <a:cs typeface="Gill Sans"/>
+                <a:sym typeface="Gill Sans"/>
+              </a:rPr>
+              <a:t>12</a:t>
+            </a:r>
+          </a:p>
+        </p:txBody>
+      </p:sp>
+    </p:spTree>
+    <p:extLst>
+      <p:ext uri="{BB962C8B-B14F-4D97-AF65-F5344CB8AC3E}">
         <p14:creationId xmlns:p14="http://schemas.microsoft.com/office/powerpoint/2010/main" val="1058216980"/>
+      </p:ext>
+    </p:extLst>
+  </p:cSld>
+  <p:clrMapOvr>
+    <a:masterClrMapping/>
+  </p:clrMapOvr>
+</p:sld>
+</file>
+
+<file path=ppt/slides/slide13.xml><?xml version="1.0" encoding="utf-8"?>
+<p:sld xmlns:a="http://schemas.openxmlformats.org/drawingml/2006/main" xmlns:r="http://schemas.openxmlformats.org/officeDocument/2006/relationships" xmlns:p="http://schemas.openxmlformats.org/presentationml/2006/main">
+  <p:cSld>
+    <p:spTree>
+      <p:nvGrpSpPr>
+        <p:cNvPr id="1" name=""/>
+        <p:cNvGrpSpPr/>
+        <p:nvPr/>
+      </p:nvGrpSpPr>
+      <p:grpSpPr>
+        <a:xfrm>
+          <a:off x="0" y="0"/>
+          <a:ext cx="0" cy="0"/>
+          <a:chOff x="0" y="0"/>
+          <a:chExt cx="0" cy="0"/>
+        </a:xfrm>
+      </p:grpSpPr>
+      <p:sp>
+        <p:nvSpPr>
+          <p:cNvPr id="4" name="Shape 43"/>
+          <p:cNvSpPr txBox="1">
+            <a:spLocks noGrp="1"/>
+          </p:cNvSpPr>
+          <p:nvPr>
+            <p:ph type="title"/>
+          </p:nvPr>
+        </p:nvSpPr>
+        <p:spPr>
+          <a:xfrm>
+            <a:off x="355600" y="150125"/>
+            <a:ext cx="12293599" cy="1652171"/>
+          </a:xfrm>
+          <a:prstGeom prst="rect">
+            <a:avLst/>
+          </a:prstGeom>
+          <a:noFill/>
+          <a:ln>
+            <a:noFill/>
+          </a:ln>
+        </p:spPr>
+        <p:txBody>
+          <a:bodyPr lIns="0" tIns="0" rIns="0" bIns="0" anchor="ctr" anchorCtr="0">
+            <a:noAutofit/>
+          </a:bodyPr>
+          <a:lstStyle/>
+          <a:p>
+            <a:pPr marL="0" marR="0" lvl="0" indent="0" algn="ctr" rtl="0">
+              <a:spcBef>
+                <a:spcPts val="0"/>
+              </a:spcBef>
+              <a:buSzPct val="25000"/>
+              <a:buNone/>
+            </a:pPr>
+            <a:r>
+              <a:rPr lang="en-GB" sz="5400" dirty="0"/>
+              <a:t>Questions?</a:t>
+            </a:r>
+          </a:p>
+        </p:txBody>
+      </p:sp>
+      <p:pic>
+        <p:nvPicPr>
+          <p:cNvPr id="6" name="Shape 45"/>
+          <p:cNvPicPr preferRelativeResize="0"/>
+          <p:nvPr/>
+        </p:nvPicPr>
+        <p:blipFill rotWithShape="1">
+          <a:blip r:embed="rId3">
+            <a:alphaModFix/>
+          </a:blip>
+          <a:srcRect/>
+          <a:stretch/>
+        </p:blipFill>
+        <p:spPr>
+          <a:xfrm>
+            <a:off x="10566400" y="8579242"/>
+            <a:ext cx="2082800" cy="900915"/>
+          </a:xfrm>
+          <a:prstGeom prst="rect">
+            <a:avLst/>
+          </a:prstGeom>
+          <a:noFill/>
+          <a:ln>
+            <a:noFill/>
+          </a:ln>
+        </p:spPr>
+      </p:pic>
+      <p:sp>
+        <p:nvSpPr>
+          <p:cNvPr id="7" name="Shape 47"/>
+          <p:cNvSpPr txBox="1"/>
+          <p:nvPr/>
+        </p:nvSpPr>
+        <p:spPr>
+          <a:xfrm>
+            <a:off x="3874426" y="9131350"/>
+            <a:ext cx="5623800" cy="379500"/>
+          </a:xfrm>
+          <a:prstGeom prst="rect">
+            <a:avLst/>
+          </a:prstGeom>
+          <a:noFill/>
+          <a:ln>
+            <a:noFill/>
+          </a:ln>
+        </p:spPr>
+        <p:txBody>
+          <a:bodyPr lIns="50800" tIns="50800" rIns="50800" bIns="50800" anchor="ctr" anchorCtr="0">
+            <a:noAutofit/>
+          </a:bodyPr>
+          <a:lstStyle/>
+          <a:p>
+            <a:pPr marL="0" marR="0" lvl="0" indent="0" algn="ctr" rtl="0">
+              <a:spcBef>
+                <a:spcPts val="0"/>
+              </a:spcBef>
+              <a:buSzPct val="25000"/>
+              <a:buNone/>
+            </a:pPr>
+            <a:r>
+              <a:rPr lang="en-GB" sz="1800" b="0" i="0" u="none" strike="noStrike" cap="none" dirty="0">
+                <a:solidFill>
+                  <a:srgbClr val="535353"/>
+                </a:solidFill>
+                <a:latin typeface="Gill Sans"/>
+                <a:ea typeface="Gill Sans"/>
+                <a:cs typeface="Gill Sans"/>
+                <a:sym typeface="Gill Sans"/>
+              </a:rPr>
+              <a:t>Joaquim Leitão – R</a:t>
+            </a:r>
+            <a:r>
+              <a:rPr lang="en-GB" sz="1800" dirty="0">
+                <a:solidFill>
+                  <a:srgbClr val="535353"/>
+                </a:solidFill>
+                <a:latin typeface="Gill Sans"/>
+                <a:ea typeface="Gill Sans"/>
+                <a:cs typeface="Gill Sans"/>
+                <a:sym typeface="Gill Sans"/>
+              </a:rPr>
+              <a:t>eal Time Learning in Intelligent Systems</a:t>
+            </a:r>
+          </a:p>
+        </p:txBody>
+      </p:sp>
+      <p:sp>
+        <p:nvSpPr>
+          <p:cNvPr id="8" name="Shape 46"/>
+          <p:cNvSpPr txBox="1"/>
+          <p:nvPr/>
+        </p:nvSpPr>
+        <p:spPr>
+          <a:xfrm>
+            <a:off x="355600" y="9131343"/>
+            <a:ext cx="600892" cy="379591"/>
+          </a:xfrm>
+          <a:prstGeom prst="rect">
+            <a:avLst/>
+          </a:prstGeom>
+          <a:noFill/>
+          <a:ln>
+            <a:noFill/>
+          </a:ln>
+        </p:spPr>
+        <p:txBody>
+          <a:bodyPr lIns="50800" tIns="50800" rIns="50800" bIns="50800" anchor="ctr" anchorCtr="0">
+            <a:noAutofit/>
+          </a:bodyPr>
+          <a:lstStyle/>
+          <a:p>
+            <a:pPr marL="0" marR="0" lvl="0" indent="0" algn="ctr" rtl="0">
+              <a:lnSpc>
+                <a:spcPct val="100000"/>
+              </a:lnSpc>
+              <a:spcBef>
+                <a:spcPts val="0"/>
+              </a:spcBef>
+              <a:spcAft>
+                <a:spcPts val="0"/>
+              </a:spcAft>
+              <a:buClr>
+                <a:srgbClr val="535353"/>
+              </a:buClr>
+              <a:buSzPct val="25000"/>
+              <a:buFont typeface="Gill Sans"/>
+              <a:buNone/>
+            </a:pPr>
+            <a:r>
+              <a:rPr lang="en-GB" sz="1800" b="0" i="0" u="none" strike="noStrike" cap="none" dirty="0">
+                <a:solidFill>
+                  <a:srgbClr val="535353"/>
+                </a:solidFill>
+                <a:latin typeface="Gill Sans"/>
+                <a:ea typeface="Gill Sans"/>
+                <a:cs typeface="Gill Sans"/>
+                <a:sym typeface="Gill Sans"/>
+              </a:rPr>
+              <a:t>13</a:t>
+            </a:r>
+          </a:p>
+        </p:txBody>
+      </p:sp>
+      <p:pic>
+        <p:nvPicPr>
+          <p:cNvPr id="10" name="pasted-image-small.png"/>
+          <p:cNvPicPr/>
+          <p:nvPr/>
+        </p:nvPicPr>
+        <p:blipFill>
+          <a:blip r:embed="rId4">
+            <a:extLst/>
+          </a:blip>
+          <a:stretch>
+            <a:fillRect/>
+          </a:stretch>
+        </p:blipFill>
+        <p:spPr>
+          <a:xfrm>
+            <a:off x="4401410" y="1564932"/>
+            <a:ext cx="4201980" cy="7327080"/>
+          </a:xfrm>
+          <a:prstGeom prst="rect">
+            <a:avLst/>
+          </a:prstGeom>
+          <a:ln w="12700">
+            <a:miter lim="400000"/>
+          </a:ln>
+          <a:effectLst>
+            <a:outerShdw blurRad="190500" dist="254000" dir="5400000" rotWithShape="0">
+              <a:srgbClr val="000000"/>
+            </a:outerShdw>
+          </a:effectLst>
+        </p:spPr>
+      </p:pic>
+    </p:spTree>
+    <p:extLst>
+      <p:ext uri="{BB962C8B-B14F-4D97-AF65-F5344CB8AC3E}">
+        <p14:creationId xmlns:p14="http://schemas.microsoft.com/office/powerpoint/2010/main" val="1326089130"/>
       </p:ext>
     </p:extLst>
   </p:cSld>
@@ -4720,7 +5496,7 @@
             </a:pPr>
             <a:r>
               <a:rPr lang="en-GB" sz="3800" dirty="0"/>
-              <a:t>55 families – 1 classifier per family</a:t>
+              <a:t>55 families – 2 classifiers per family</a:t>
             </a:r>
           </a:p>
           <a:p>
@@ -4788,7 +5564,7 @@
           <p:nvPr/>
         </p:nvPicPr>
         <p:blipFill rotWithShape="1">
-          <a:blip r:embed="rId2">
+          <a:blip r:embed="rId3">
             <a:alphaModFix/>
           </a:blip>
           <a:srcRect/>
@@ -5306,7 +6082,7 @@
             </a:pPr>
             <a:r>
               <a:rPr lang="en-GB" sz="5400" dirty="0"/>
-              <a:t>Data Representation</a:t>
+              <a:t>Pre-Processing</a:t>
             </a:r>
           </a:p>
         </p:txBody>
@@ -5324,7 +6100,7 @@
         <p:spPr>
           <a:xfrm>
             <a:off x="355600" y="2730500"/>
-            <a:ext cx="12293599" cy="1722230"/>
+            <a:ext cx="12293599" cy="6299200"/>
           </a:xfrm>
           <a:prstGeom prst="rect">
             <a:avLst/>
@@ -5340,7 +6116,24 @@
           </a:bodyPr>
           <a:lstStyle/>
           <a:p>
-            <a:pPr marL="1071562" marR="0" lvl="0" indent="-538162" algn="just" rtl="0">
+            <a:pPr marL="1276350" marR="0" lvl="0" indent="-742950" algn="just" rtl="0">
+              <a:lnSpc>
+                <a:spcPct val="100000"/>
+              </a:lnSpc>
+              <a:spcBef>
+                <a:spcPts val="3700"/>
+              </a:spcBef>
+              <a:buSzPct val="98157"/>
+              <a:buFont typeface="Arial" panose="020B0604020202020204" pitchFamily="34" charset="0"/>
+              <a:buChar char="•"/>
+            </a:pPr>
+            <a:r>
+              <a:rPr lang="en-GB" dirty="0"/>
+              <a:t>SCOP40mini.fasta</a:t>
+            </a:r>
+          </a:p>
+          <a:p>
+            <a:pPr marL="4195762" lvl="5" indent="-538162" algn="just">
               <a:lnSpc>
                 <a:spcPct val="100000"/>
               </a:lnSpc>
@@ -5352,12 +6145,26 @@
               <a:buChar char="•"/>
             </a:pPr>
             <a:r>
+              <a:rPr lang="en-GB" sz="3600" dirty="0"/>
+              <a:t>Genetic coding sequences for several protein sequences</a:t>
+            </a:r>
+          </a:p>
+          <a:p>
+            <a:pPr marL="1276350" lvl="0" indent="-742950" algn="just">
+              <a:spcBef>
+                <a:spcPts val="3700"/>
+              </a:spcBef>
+              <a:buSzPct val="98157"/>
+              <a:buFont typeface="Arial" panose="020B0604020202020204" pitchFamily="34" charset="0"/>
+              <a:buChar char="•"/>
+            </a:pPr>
+            <a:r>
               <a:rPr lang="en-GB" dirty="0"/>
-              <a:t>Count number of occurrences of each nucleotide</a:t>
-            </a:r>
-          </a:p>
-          <a:p>
-            <a:pPr marL="1071562" marR="0" lvl="0" indent="-538162" algn="just" rtl="0">
+              <a:t>SCOP40mini_sequence_minidatabase_19.cast</a:t>
+            </a:r>
+          </a:p>
+          <a:p>
+            <a:pPr marL="4195762" lvl="5" indent="-538162" algn="just">
               <a:lnSpc>
                 <a:spcPct val="100000"/>
               </a:lnSpc>
@@ -5369,8 +6176,8 @@
               <a:buChar char="•"/>
             </a:pPr>
             <a:r>
-              <a:rPr lang="en-GB" dirty="0"/>
-              <a:t>Exclude “x” nucleotides – Missing Data</a:t>
+              <a:rPr lang="en-GB" sz="3600" dirty="0"/>
+              <a:t>Map between sequences to be used in training and testing for each family</a:t>
             </a:r>
           </a:p>
         </p:txBody>
@@ -5382,7 +6189,7 @@
           <p:nvPr/>
         </p:nvPicPr>
         <p:blipFill rotWithShape="1">
-          <a:blip r:embed="rId2">
+          <a:blip r:embed="rId3">
             <a:alphaModFix/>
           </a:blip>
           <a:srcRect/>
@@ -5518,34 +6325,10 @@
           </a:p>
         </p:txBody>
       </p:sp>
-      <p:pic>
-        <p:nvPicPr>
-          <p:cNvPr id="3" name="Imagem 2"/>
-          <p:cNvPicPr>
-            <a:picLocks noChangeAspect="1"/>
-          </p:cNvPicPr>
-          <p:nvPr/>
-        </p:nvPicPr>
-        <p:blipFill>
-          <a:blip r:embed="rId3"/>
-          <a:stretch>
-            <a:fillRect/>
-          </a:stretch>
-        </p:blipFill>
-        <p:spPr>
-          <a:xfrm>
-            <a:off x="1695938" y="5104980"/>
-            <a:ext cx="9612921" cy="3010788"/>
-          </a:xfrm>
-          <a:prstGeom prst="rect">
-            <a:avLst/>
-          </a:prstGeom>
-        </p:spPr>
-      </p:pic>
     </p:spTree>
     <p:extLst>
       <p:ext uri="{BB962C8B-B14F-4D97-AF65-F5344CB8AC3E}">
-        <p14:creationId xmlns:p14="http://schemas.microsoft.com/office/powerpoint/2010/main" val="2607036589"/>
+        <p14:creationId xmlns:p14="http://schemas.microsoft.com/office/powerpoint/2010/main" val="172727134"/>
       </p:ext>
     </p:extLst>
   </p:cSld>
@@ -5610,13 +6393,340 @@
             </a:pPr>
             <a:r>
               <a:rPr lang="en-GB" sz="5400" dirty="0"/>
-              <a:t>Support Vector Machines</a:t>
+              <a:t>Data Representation</a:t>
             </a:r>
           </a:p>
         </p:txBody>
       </p:sp>
-      <mc:AlternateContent xmlns:mc="http://schemas.openxmlformats.org/markup-compatibility/2006">
-        <mc:Choice xmlns:a14="http://schemas.microsoft.com/office/drawing/2010/main" Requires="a14">
+      <p:sp>
+        <p:nvSpPr>
+          <p:cNvPr id="5" name="Shape 44"/>
+          <p:cNvSpPr txBox="1">
+            <a:spLocks noGrp="1"/>
+          </p:cNvSpPr>
+          <p:nvPr>
+            <p:ph type="body" idx="1"/>
+          </p:nvPr>
+        </p:nvSpPr>
+        <p:spPr>
+          <a:xfrm>
+            <a:off x="355600" y="2120899"/>
+            <a:ext cx="12293599" cy="3789570"/>
+          </a:xfrm>
+          <a:prstGeom prst="rect">
+            <a:avLst/>
+          </a:prstGeom>
+          <a:noFill/>
+          <a:ln>
+            <a:noFill/>
+          </a:ln>
+        </p:spPr>
+        <p:txBody>
+          <a:bodyPr lIns="0" tIns="0" rIns="0" bIns="0" anchor="t" anchorCtr="0">
+            <a:noAutofit/>
+          </a:bodyPr>
+          <a:lstStyle/>
+          <a:p>
+            <a:pPr marL="1276350" lvl="0" indent="-742950" algn="just">
+              <a:spcBef>
+                <a:spcPts val="3700"/>
+              </a:spcBef>
+              <a:buSzPct val="98157"/>
+              <a:buFont typeface="Arial" panose="020B0604020202020204" pitchFamily="34" charset="0"/>
+              <a:buChar char="•"/>
+            </a:pPr>
+            <a:r>
+              <a:rPr lang="en-GB" b="1" dirty="0"/>
+              <a:t>Segmentation</a:t>
+            </a:r>
+          </a:p>
+          <a:p>
+            <a:pPr marL="4195762" lvl="5" indent="-538162" algn="just">
+              <a:lnSpc>
+                <a:spcPct val="100000"/>
+              </a:lnSpc>
+              <a:spcBef>
+                <a:spcPts val="3700"/>
+              </a:spcBef>
+              <a:buSzPct val="98157"/>
+              <a:buFont typeface="Arial"/>
+              <a:buChar char="•"/>
+            </a:pPr>
+            <a:r>
+              <a:rPr lang="en-GB" sz="3600" dirty="0"/>
+              <a:t>Count number of occurrences of each nucleotide</a:t>
+            </a:r>
+          </a:p>
+          <a:p>
+            <a:pPr marL="1071562" marR="0" lvl="0" indent="-538162" algn="just" rtl="0">
+              <a:lnSpc>
+                <a:spcPct val="100000"/>
+              </a:lnSpc>
+              <a:spcBef>
+                <a:spcPts val="3700"/>
+              </a:spcBef>
+              <a:buSzPct val="98157"/>
+              <a:buFont typeface="Arial"/>
+              <a:buChar char="•"/>
+            </a:pPr>
+            <a:r>
+              <a:rPr lang="en-GB" dirty="0"/>
+              <a:t>Exclude “x” nucleotides – Missing Data</a:t>
+            </a:r>
+          </a:p>
+        </p:txBody>
+      </p:sp>
+      <p:pic>
+        <p:nvPicPr>
+          <p:cNvPr id="6" name="Shape 45"/>
+          <p:cNvPicPr preferRelativeResize="0"/>
+          <p:nvPr/>
+        </p:nvPicPr>
+        <p:blipFill rotWithShape="1">
+          <a:blip r:embed="rId2">
+            <a:alphaModFix/>
+          </a:blip>
+          <a:srcRect/>
+          <a:stretch/>
+        </p:blipFill>
+        <p:spPr>
+          <a:xfrm>
+            <a:off x="10566400" y="8579242"/>
+            <a:ext cx="2082800" cy="900915"/>
+          </a:xfrm>
+          <a:prstGeom prst="rect">
+            <a:avLst/>
+          </a:prstGeom>
+          <a:noFill/>
+          <a:ln>
+            <a:noFill/>
+          </a:ln>
+        </p:spPr>
+      </p:pic>
+      <p:sp>
+        <p:nvSpPr>
+          <p:cNvPr id="7" name="Shape 47"/>
+          <p:cNvSpPr txBox="1"/>
+          <p:nvPr/>
+        </p:nvSpPr>
+        <p:spPr>
+          <a:xfrm>
+            <a:off x="3874426" y="9131350"/>
+            <a:ext cx="5623800" cy="379500"/>
+          </a:xfrm>
+          <a:prstGeom prst="rect">
+            <a:avLst/>
+          </a:prstGeom>
+          <a:noFill/>
+          <a:ln>
+            <a:noFill/>
+          </a:ln>
+        </p:spPr>
+        <p:txBody>
+          <a:bodyPr lIns="50800" tIns="50800" rIns="50800" bIns="50800" anchor="ctr" anchorCtr="0">
+            <a:noAutofit/>
+          </a:bodyPr>
+          <a:lstStyle/>
+          <a:p>
+            <a:pPr marL="0" marR="0" lvl="0" indent="0" algn="ctr" rtl="0">
+              <a:spcBef>
+                <a:spcPts val="0"/>
+              </a:spcBef>
+              <a:buSzPct val="25000"/>
+              <a:buNone/>
+            </a:pPr>
+            <a:r>
+              <a:rPr lang="en-GB" sz="1800" b="0" i="0" u="none" strike="noStrike" cap="none" dirty="0">
+                <a:solidFill>
+                  <a:srgbClr val="535353"/>
+                </a:solidFill>
+                <a:latin typeface="Gill Sans"/>
+                <a:ea typeface="Gill Sans"/>
+                <a:cs typeface="Gill Sans"/>
+                <a:sym typeface="Gill Sans"/>
+              </a:rPr>
+              <a:t>Joaquim Leitão – R</a:t>
+            </a:r>
+            <a:r>
+              <a:rPr lang="en-GB" sz="1800" dirty="0">
+                <a:solidFill>
+                  <a:srgbClr val="535353"/>
+                </a:solidFill>
+                <a:latin typeface="Gill Sans"/>
+                <a:ea typeface="Gill Sans"/>
+                <a:cs typeface="Gill Sans"/>
+                <a:sym typeface="Gill Sans"/>
+              </a:rPr>
+              <a:t>eal Time Learning in Intelligent Systems</a:t>
+            </a:r>
+          </a:p>
+        </p:txBody>
+      </p:sp>
+      <p:sp>
+        <p:nvSpPr>
+          <p:cNvPr id="8" name="Shape 46"/>
+          <p:cNvSpPr txBox="1"/>
+          <p:nvPr/>
+        </p:nvSpPr>
+        <p:spPr>
+          <a:xfrm>
+            <a:off x="355600" y="9131343"/>
+            <a:ext cx="600892" cy="379591"/>
+          </a:xfrm>
+          <a:prstGeom prst="rect">
+            <a:avLst/>
+          </a:prstGeom>
+          <a:noFill/>
+          <a:ln>
+            <a:noFill/>
+          </a:ln>
+        </p:spPr>
+        <p:txBody>
+          <a:bodyPr lIns="50800" tIns="50800" rIns="50800" bIns="50800" anchor="ctr" anchorCtr="0">
+            <a:noAutofit/>
+          </a:bodyPr>
+          <a:lstStyle/>
+          <a:p>
+            <a:pPr marL="0" marR="0" lvl="0" indent="0" algn="ctr" rtl="0">
+              <a:lnSpc>
+                <a:spcPct val="100000"/>
+              </a:lnSpc>
+              <a:spcBef>
+                <a:spcPts val="0"/>
+              </a:spcBef>
+              <a:spcAft>
+                <a:spcPts val="0"/>
+              </a:spcAft>
+              <a:buClr>
+                <a:srgbClr val="535353"/>
+              </a:buClr>
+              <a:buSzPct val="25000"/>
+              <a:buFont typeface="Gill Sans"/>
+              <a:buNone/>
+            </a:pPr>
+            <a:r>
+              <a:rPr lang="en-GB" sz="1800" dirty="0">
+                <a:solidFill>
+                  <a:srgbClr val="535353"/>
+                </a:solidFill>
+                <a:latin typeface="Gill Sans"/>
+                <a:ea typeface="Gill Sans"/>
+                <a:cs typeface="Gill Sans"/>
+                <a:sym typeface="Gill Sans"/>
+              </a:rPr>
+              <a:t>5</a:t>
+            </a:r>
+            <a:endParaRPr lang="en-GB" sz="1800" b="0" i="0" u="none" strike="noStrike" cap="none" dirty="0">
+              <a:solidFill>
+                <a:srgbClr val="535353"/>
+              </a:solidFill>
+              <a:latin typeface="Gill Sans"/>
+              <a:ea typeface="Gill Sans"/>
+              <a:cs typeface="Gill Sans"/>
+              <a:sym typeface="Gill Sans"/>
+            </a:endParaRPr>
+          </a:p>
+        </p:txBody>
+      </p:sp>
+      <p:pic>
+        <p:nvPicPr>
+          <p:cNvPr id="3" name="Imagem 2"/>
+          <p:cNvPicPr>
+            <a:picLocks noChangeAspect="1"/>
+          </p:cNvPicPr>
+          <p:nvPr/>
+        </p:nvPicPr>
+        <p:blipFill>
+          <a:blip r:embed="rId3"/>
+          <a:stretch>
+            <a:fillRect/>
+          </a:stretch>
+        </p:blipFill>
+        <p:spPr>
+          <a:xfrm>
+            <a:off x="1258616" y="5688074"/>
+            <a:ext cx="9612921" cy="3010788"/>
+          </a:xfrm>
+          <a:prstGeom prst="rect">
+            <a:avLst/>
+          </a:prstGeom>
+        </p:spPr>
+      </p:pic>
+    </p:spTree>
+    <p:extLst>
+      <p:ext uri="{BB962C8B-B14F-4D97-AF65-F5344CB8AC3E}">
+        <p14:creationId xmlns:p14="http://schemas.microsoft.com/office/powerpoint/2010/main" val="2607036589"/>
+      </p:ext>
+    </p:extLst>
+  </p:cSld>
+  <p:clrMapOvr>
+    <a:masterClrMapping/>
+  </p:clrMapOvr>
+</p:sld>
+</file>
+
+<file path=ppt/slides/slide6.xml><?xml version="1.0" encoding="utf-8"?>
+<p:sld xmlns:a="http://schemas.openxmlformats.org/drawingml/2006/main" xmlns:r="http://schemas.openxmlformats.org/officeDocument/2006/relationships" xmlns:p="http://schemas.openxmlformats.org/presentationml/2006/main">
+  <p:cSld>
+    <p:spTree>
+      <p:nvGrpSpPr>
+        <p:cNvPr id="1" name=""/>
+        <p:cNvGrpSpPr/>
+        <p:nvPr/>
+      </p:nvGrpSpPr>
+      <p:grpSpPr>
+        <a:xfrm>
+          <a:off x="0" y="0"/>
+          <a:ext cx="0" cy="0"/>
+          <a:chOff x="0" y="0"/>
+          <a:chExt cx="0" cy="0"/>
+        </a:xfrm>
+      </p:grpSpPr>
+      <p:sp>
+        <p:nvSpPr>
+          <p:cNvPr id="4" name="Shape 43"/>
+          <p:cNvSpPr txBox="1">
+            <a:spLocks noGrp="1"/>
+          </p:cNvSpPr>
+          <p:nvPr>
+            <p:ph type="title"/>
+          </p:nvPr>
+        </p:nvSpPr>
+        <p:spPr>
+          <a:xfrm>
+            <a:off x="355600" y="150125"/>
+            <a:ext cx="12293599" cy="1928125"/>
+          </a:xfrm>
+          <a:prstGeom prst="rect">
+            <a:avLst/>
+          </a:prstGeom>
+          <a:noFill/>
+          <a:ln>
+            <a:noFill/>
+          </a:ln>
+        </p:spPr>
+        <p:txBody>
+          <a:bodyPr lIns="0" tIns="0" rIns="0" bIns="0" anchor="ctr" anchorCtr="0">
+            <a:noAutofit/>
+          </a:bodyPr>
+          <a:lstStyle/>
+          <a:p>
+            <a:pPr marL="0" marR="0" lvl="0" indent="0" algn="ctr" rtl="0">
+              <a:spcBef>
+                <a:spcPts val="0"/>
+              </a:spcBef>
+              <a:buSzPct val="25000"/>
+              <a:buNone/>
+            </a:pPr>
+            <a:r>
+              <a:rPr lang="en-GB" sz="5400" dirty="0"/>
+              <a:t>Support Vector Machines</a:t>
+            </a:r>
+          </a:p>
+        </p:txBody>
+      </p:sp>
+      <mc:AlternateContent xmlns:mc="http://schemas.openxmlformats.org/markup-compatibility/2006" xmlns:a14="http://schemas.microsoft.com/office/drawing/2010/main">
+        <mc:Choice Requires="a14">
           <p:sp>
             <p:nvSpPr>
               <p:cNvPr id="5" name="Shape 44"/>
@@ -5695,7 +6805,7 @@
                       <a:rPr lang="pt-PT" sz="3800" b="0" i="0" smtClean="0">
                         <a:latin typeface="Cambria Math" panose="02040503050406030204" pitchFamily="18" charset="0"/>
                       </a:rPr>
-                      <m:t>-</m:t>
+                      <m:t>−</m:t>
                     </m:r>
                     <m:r>
                       <m:rPr>
@@ -5846,7 +6956,7 @@
             </p:txBody>
           </p:sp>
         </mc:Choice>
-        <mc:Fallback>
+        <mc:Fallback xmlns="">
           <p:sp>
             <p:nvSpPr>
               <p:cNvPr id="5" name="Shape 44"/>
@@ -6028,7 +7138,7 @@
                 <a:cs typeface="Gill Sans"/>
                 <a:sym typeface="Gill Sans"/>
               </a:rPr>
-              <a:t>5</a:t>
+              <a:t>6</a:t>
             </a:r>
           </a:p>
         </p:txBody>
@@ -6046,7 +7156,7 @@
 </p:sld>
 </file>
 
-<file path=ppt/slides/slide6.xml><?xml version="1.0" encoding="utf-8"?>
+<file path=ppt/slides/slide7.xml><?xml version="1.0" encoding="utf-8"?>
 <p:sld xmlns:a="http://schemas.openxmlformats.org/drawingml/2006/main" xmlns:r="http://schemas.openxmlformats.org/officeDocument/2006/relationships" xmlns:p="http://schemas.openxmlformats.org/presentationml/2006/main">
   <p:cSld>
     <p:spTree>
@@ -6106,8 +7216,8 @@
           </a:p>
         </p:txBody>
       </p:sp>
-      <mc:AlternateContent xmlns:mc="http://schemas.openxmlformats.org/markup-compatibility/2006">
-        <mc:Choice xmlns:a14="http://schemas.microsoft.com/office/drawing/2010/main" Requires="a14">
+      <mc:AlternateContent xmlns:mc="http://schemas.openxmlformats.org/markup-compatibility/2006" xmlns:a14="http://schemas.microsoft.com/office/drawing/2010/main">
+        <mc:Choice Requires="a14">
           <p:sp>
             <p:nvSpPr>
               <p:cNvPr id="5" name="Shape 44"/>
@@ -6205,10 +7315,10 @@
                       </m:sSupPr>
                       <m:e>
                         <m:r>
-                          <a:rPr lang="pt-PT" sz="3600" i="1">
+                          <a:rPr lang="pt-PT" sz="3600" b="0" i="1" smtClean="0">
                             <a:latin typeface="Cambria Math" panose="02040503050406030204" pitchFamily="18" charset="0"/>
                           </a:rPr>
-                          <m:t>10</m:t>
+                          <m:t>2</m:t>
                         </m:r>
                       </m:e>
                       <m:sup>
@@ -6216,7 +7326,13 @@
                           <a:rPr lang="pt-PT" sz="3600" i="1">
                             <a:latin typeface="Cambria Math" panose="02040503050406030204" pitchFamily="18" charset="0"/>
                           </a:rPr>
-                          <m:t>−3</m:t>
+                          <m:t>−</m:t>
+                        </m:r>
+                        <m:r>
+                          <a:rPr lang="pt-PT" sz="3600" b="0" i="1" smtClean="0">
+                            <a:latin typeface="Cambria Math" panose="02040503050406030204" pitchFamily="18" charset="0"/>
+                          </a:rPr>
+                          <m:t>5</m:t>
                         </m:r>
                       </m:sup>
                     </m:sSup>
@@ -6236,10 +7352,10 @@
                       </m:sSupPr>
                       <m:e>
                         <m:r>
-                          <a:rPr lang="pt-PT" sz="3600" i="1">
+                          <a:rPr lang="pt-PT" sz="3600" b="0" i="1" smtClean="0">
                             <a:latin typeface="Cambria Math" panose="02040503050406030204" pitchFamily="18" charset="0"/>
                           </a:rPr>
-                          <m:t>10</m:t>
+                          <m:t>2</m:t>
                         </m:r>
                       </m:e>
                       <m:sup>
@@ -6247,7 +7363,13 @@
                           <a:rPr lang="pt-PT" sz="3600" i="1">
                             <a:latin typeface="Cambria Math" panose="02040503050406030204" pitchFamily="18" charset="0"/>
                           </a:rPr>
-                          <m:t>−2</m:t>
+                          <m:t>−</m:t>
+                        </m:r>
+                        <m:r>
+                          <a:rPr lang="pt-PT" sz="3600" b="0" i="1" smtClean="0">
+                            <a:latin typeface="Cambria Math" panose="02040503050406030204" pitchFamily="18" charset="0"/>
+                          </a:rPr>
+                          <m:t>4</m:t>
                         </m:r>
                       </m:sup>
                     </m:sSup>
@@ -6267,18 +7389,18 @@
                       </m:sSupPr>
                       <m:e>
                         <m:r>
-                          <a:rPr lang="pt-PT" sz="3600" i="1">
+                          <a:rPr lang="pt-PT" sz="3600" b="0" i="1" smtClean="0">
                             <a:latin typeface="Cambria Math" panose="02040503050406030204" pitchFamily="18" charset="0"/>
                           </a:rPr>
-                          <m:t>10</m:t>
+                          <m:t>2</m:t>
                         </m:r>
                       </m:e>
                       <m:sup>
                         <m:r>
-                          <a:rPr lang="pt-PT" sz="3600" i="1">
+                          <a:rPr lang="pt-PT" sz="3600" b="0" i="1" smtClean="0">
                             <a:latin typeface="Cambria Math" panose="02040503050406030204" pitchFamily="18" charset="0"/>
                           </a:rPr>
-                          <m:t>3</m:t>
+                          <m:t>15</m:t>
                         </m:r>
                       </m:sup>
                     </m:sSup>
@@ -6315,10 +7437,10 @@
                       </m:sSupPr>
                       <m:e>
                         <m:r>
-                          <a:rPr lang="pt-PT" sz="3600" i="1">
+                          <a:rPr lang="pt-PT" sz="3600" b="0" i="1" smtClean="0">
                             <a:latin typeface="Cambria Math" panose="02040503050406030204" pitchFamily="18" charset="0"/>
                           </a:rPr>
-                          <m:t>10</m:t>
+                          <m:t>2</m:t>
                         </m:r>
                       </m:e>
                       <m:sup>
@@ -6329,10 +7451,10 @@
                           <m:t>−</m:t>
                         </m:r>
                         <m:r>
-                          <a:rPr lang="pt-PT" sz="3600" i="1">
+                          <a:rPr lang="pt-PT" sz="3600" b="0" i="1" smtClean="0">
                             <a:latin typeface="Cambria Math" panose="02040503050406030204" pitchFamily="18" charset="0"/>
                           </a:rPr>
-                          <m:t>4</m:t>
+                          <m:t>15</m:t>
                         </m:r>
                       </m:sup>
                     </m:sSup>
@@ -6352,10 +7474,10 @@
                       </m:sSupPr>
                       <m:e>
                         <m:r>
-                          <a:rPr lang="pt-PT" sz="3600" i="1">
+                          <a:rPr lang="pt-PT" sz="3600" b="0" i="1" smtClean="0">
                             <a:latin typeface="Cambria Math" panose="02040503050406030204" pitchFamily="18" charset="0"/>
                           </a:rPr>
-                          <m:t>10</m:t>
+                          <m:t>2</m:t>
                         </m:r>
                       </m:e>
                       <m:sup>
@@ -6366,10 +7488,10 @@
                           <m:t>−</m:t>
                         </m:r>
                         <m:r>
-                          <a:rPr lang="pt-PT" sz="3600" i="1">
+                          <a:rPr lang="pt-PT" sz="3600" b="0" i="1" smtClean="0">
                             <a:latin typeface="Cambria Math" panose="02040503050406030204" pitchFamily="18" charset="0"/>
                           </a:rPr>
-                          <m:t>3</m:t>
+                          <m:t>14</m:t>
                         </m:r>
                       </m:sup>
                     </m:sSup>
@@ -6389,18 +7511,18 @@
                       </m:sSupPr>
                       <m:e>
                         <m:r>
-                          <a:rPr lang="pt-PT" sz="3600" i="1">
+                          <a:rPr lang="pt-PT" sz="3600" b="0" i="1" smtClean="0">
                             <a:latin typeface="Cambria Math" panose="02040503050406030204" pitchFamily="18" charset="0"/>
                           </a:rPr>
-                          <m:t>10</m:t>
+                          <m:t>2</m:t>
                         </m:r>
                       </m:e>
                       <m:sup>
                         <m:r>
-                          <a:rPr lang="pt-PT" sz="3600" i="1">
+                          <a:rPr lang="pt-PT" sz="3600" b="0" i="1" smtClean="0">
                             <a:latin typeface="Cambria Math" panose="02040503050406030204" pitchFamily="18" charset="0"/>
                           </a:rPr>
-                          <m:t>4</m:t>
+                          <m:t>15</m:t>
                         </m:r>
                       </m:sup>
                     </m:sSup>
@@ -6411,7 +7533,7 @@
             </p:txBody>
           </p:sp>
         </mc:Choice>
-        <mc:Fallback>
+        <mc:Fallback xmlns="">
           <p:sp>
             <p:nvSpPr>
               <p:cNvPr id="5" name="Shape 44"/>
@@ -6593,7 +7715,7 @@
                 <a:cs typeface="Gill Sans"/>
                 <a:sym typeface="Gill Sans"/>
               </a:rPr>
-              <a:t>6</a:t>
+              <a:t>7</a:t>
             </a:r>
           </a:p>
         </p:txBody>
@@ -6602,321 +7724,6 @@
     <p:extLst>
       <p:ext uri="{BB962C8B-B14F-4D97-AF65-F5344CB8AC3E}">
         <p14:creationId xmlns:p14="http://schemas.microsoft.com/office/powerpoint/2010/main" val="2559228923"/>
-      </p:ext>
-    </p:extLst>
-  </p:cSld>
-  <p:clrMapOvr>
-    <a:masterClrMapping/>
-  </p:clrMapOvr>
-</p:sld>
-</file>
-
-<file path=ppt/slides/slide7.xml><?xml version="1.0" encoding="utf-8"?>
-<p:sld xmlns:a="http://schemas.openxmlformats.org/drawingml/2006/main" xmlns:r="http://schemas.openxmlformats.org/officeDocument/2006/relationships" xmlns:p="http://schemas.openxmlformats.org/presentationml/2006/main">
-  <p:cSld>
-    <p:spTree>
-      <p:nvGrpSpPr>
-        <p:cNvPr id="1" name=""/>
-        <p:cNvGrpSpPr/>
-        <p:nvPr/>
-      </p:nvGrpSpPr>
-      <p:grpSpPr>
-        <a:xfrm>
-          <a:off x="0" y="0"/>
-          <a:ext cx="0" cy="0"/>
-          <a:chOff x="0" y="0"/>
-          <a:chExt cx="0" cy="0"/>
-        </a:xfrm>
-      </p:grpSpPr>
-      <p:sp>
-        <p:nvSpPr>
-          <p:cNvPr id="4" name="Shape 43"/>
-          <p:cNvSpPr txBox="1">
-            <a:spLocks noGrp="1"/>
-          </p:cNvSpPr>
-          <p:nvPr>
-            <p:ph type="title"/>
-          </p:nvPr>
-        </p:nvSpPr>
-        <p:spPr>
-          <a:xfrm>
-            <a:off x="355600" y="150125"/>
-            <a:ext cx="12293599" cy="1928125"/>
-          </a:xfrm>
-          <a:prstGeom prst="rect">
-            <a:avLst/>
-          </a:prstGeom>
-          <a:noFill/>
-          <a:ln>
-            <a:noFill/>
-          </a:ln>
-        </p:spPr>
-        <p:txBody>
-          <a:bodyPr lIns="0" tIns="0" rIns="0" bIns="0" anchor="ctr" anchorCtr="0">
-            <a:noAutofit/>
-          </a:bodyPr>
-          <a:lstStyle/>
-          <a:p>
-            <a:pPr marL="0" marR="0" lvl="0" indent="0" algn="ctr" rtl="0">
-              <a:spcBef>
-                <a:spcPts val="0"/>
-              </a:spcBef>
-              <a:buSzPct val="25000"/>
-              <a:buNone/>
-            </a:pPr>
-            <a:r>
-              <a:rPr lang="en-GB" sz="5400" dirty="0"/>
-              <a:t>Support Vector Machines - Results</a:t>
-            </a:r>
-          </a:p>
-        </p:txBody>
-      </p:sp>
-      <p:sp>
-        <p:nvSpPr>
-          <p:cNvPr id="5" name="Shape 44"/>
-          <p:cNvSpPr txBox="1">
-            <a:spLocks noGrp="1"/>
-          </p:cNvSpPr>
-          <p:nvPr>
-            <p:ph type="body" idx="1"/>
-          </p:nvPr>
-        </p:nvSpPr>
-        <p:spPr>
-          <a:xfrm>
-            <a:off x="355600" y="2730500"/>
-            <a:ext cx="12293599" cy="6299200"/>
-          </a:xfrm>
-          <a:prstGeom prst="rect">
-            <a:avLst/>
-          </a:prstGeom>
-          <a:noFill/>
-          <a:ln>
-            <a:noFill/>
-          </a:ln>
-        </p:spPr>
-        <p:txBody>
-          <a:bodyPr lIns="0" tIns="0" rIns="0" bIns="0" anchor="t" anchorCtr="0">
-            <a:noAutofit/>
-          </a:bodyPr>
-          <a:lstStyle/>
-          <a:p>
-            <a:pPr marL="1071562" marR="0" lvl="0" indent="-538162" algn="just" rtl="0">
-              <a:lnSpc>
-                <a:spcPct val="100000"/>
-              </a:lnSpc>
-              <a:spcBef>
-                <a:spcPts val="3700"/>
-              </a:spcBef>
-              <a:buSzPct val="98157"/>
-              <a:buFont typeface="Arial"/>
-              <a:buChar char="•"/>
-            </a:pPr>
-            <a:r>
-              <a:rPr lang="en-GB" dirty="0"/>
-              <a:t>Average AUC of 0.74 in test dataset</a:t>
-            </a:r>
-          </a:p>
-          <a:p>
-            <a:pPr marL="1071562" lvl="0" indent="-538162" algn="just">
-              <a:spcBef>
-                <a:spcPts val="3700"/>
-              </a:spcBef>
-              <a:buSzPct val="98157"/>
-              <a:buFont typeface="Arial"/>
-              <a:buChar char="•"/>
-            </a:pPr>
-            <a:r>
-              <a:rPr lang="en-GB" dirty="0"/>
-              <a:t>Best AUC = 0.99 for family “b.29.1._b.29.1.2.” (C = 256 ; </a:t>
-            </a:r>
-            <a:r>
-              <a:rPr lang="el-GR" dirty="0"/>
-              <a:t>γ</a:t>
-            </a:r>
-            <a:r>
-              <a:rPr lang="pt-PT" dirty="0"/>
-              <a:t> = 3.9e-03)</a:t>
-            </a:r>
-            <a:endParaRPr lang="en-GB" dirty="0"/>
-          </a:p>
-          <a:p>
-            <a:pPr marL="1071562" lvl="0" indent="-538162" algn="just">
-              <a:spcBef>
-                <a:spcPts val="3700"/>
-              </a:spcBef>
-              <a:buSzPct val="98157"/>
-              <a:buFont typeface="Arial"/>
-              <a:buChar char="•"/>
-            </a:pPr>
-            <a:r>
-              <a:rPr lang="en-GB" dirty="0"/>
-              <a:t>Overfitting in families “c.26.2._c.26.2.1.” and “c.47.1._c.47.1.10.” (Train AUC = 1; Test AUC around 0.5)</a:t>
-            </a:r>
-          </a:p>
-          <a:p>
-            <a:pPr marL="1071562" lvl="0" indent="-538162" algn="just">
-              <a:spcBef>
-                <a:spcPts val="3700"/>
-              </a:spcBef>
-              <a:buSzPct val="98157"/>
-              <a:buFont typeface="Arial"/>
-              <a:buChar char="•"/>
-            </a:pPr>
-            <a:r>
-              <a:rPr lang="en-GB" dirty="0"/>
-              <a:t>Families where no classifier could be learned (Train AUC = Test AUC around 0.5)</a:t>
-            </a:r>
-            <a:endParaRPr lang="pt-PT" dirty="0"/>
-          </a:p>
-        </p:txBody>
-      </p:sp>
-      <p:pic>
-        <p:nvPicPr>
-          <p:cNvPr id="6" name="Shape 45"/>
-          <p:cNvPicPr preferRelativeResize="0"/>
-          <p:nvPr/>
-        </p:nvPicPr>
-        <p:blipFill rotWithShape="1">
-          <a:blip r:embed="rId3">
-            <a:alphaModFix/>
-          </a:blip>
-          <a:srcRect/>
-          <a:stretch/>
-        </p:blipFill>
-        <p:spPr>
-          <a:xfrm>
-            <a:off x="10566400" y="8579242"/>
-            <a:ext cx="2082800" cy="900915"/>
-          </a:xfrm>
-          <a:prstGeom prst="rect">
-            <a:avLst/>
-          </a:prstGeom>
-          <a:noFill/>
-          <a:ln>
-            <a:noFill/>
-          </a:ln>
-        </p:spPr>
-      </p:pic>
-      <p:sp>
-        <p:nvSpPr>
-          <p:cNvPr id="7" name="Shape 47"/>
-          <p:cNvSpPr txBox="1"/>
-          <p:nvPr/>
-        </p:nvSpPr>
-        <p:spPr>
-          <a:xfrm>
-            <a:off x="3874426" y="9131350"/>
-            <a:ext cx="5623800" cy="379500"/>
-          </a:xfrm>
-          <a:prstGeom prst="rect">
-            <a:avLst/>
-          </a:prstGeom>
-          <a:noFill/>
-          <a:ln>
-            <a:noFill/>
-          </a:ln>
-        </p:spPr>
-        <p:txBody>
-          <a:bodyPr lIns="50800" tIns="50800" rIns="50800" bIns="50800" anchor="ctr" anchorCtr="0">
-            <a:noAutofit/>
-          </a:bodyPr>
-          <a:lstStyle/>
-          <a:p>
-            <a:pPr marL="0" marR="0" lvl="0" indent="0" algn="ctr" rtl="0">
-              <a:spcBef>
-                <a:spcPts val="0"/>
-              </a:spcBef>
-              <a:buSzPct val="25000"/>
-              <a:buNone/>
-            </a:pPr>
-            <a:r>
-              <a:rPr lang="en-GB" sz="1800" b="0" i="0" u="none" strike="noStrike" cap="none" dirty="0">
-                <a:solidFill>
-                  <a:srgbClr val="535353"/>
-                </a:solidFill>
-                <a:latin typeface="Gill Sans"/>
-                <a:ea typeface="Gill Sans"/>
-                <a:cs typeface="Gill Sans"/>
-                <a:sym typeface="Gill Sans"/>
-              </a:rPr>
-              <a:t>Joaquim Leitão – R</a:t>
-            </a:r>
-            <a:r>
-              <a:rPr lang="en-GB" sz="1800" dirty="0">
-                <a:solidFill>
-                  <a:srgbClr val="535353"/>
-                </a:solidFill>
-                <a:latin typeface="Gill Sans"/>
-                <a:ea typeface="Gill Sans"/>
-                <a:cs typeface="Gill Sans"/>
-                <a:sym typeface="Gill Sans"/>
-              </a:rPr>
-              <a:t>eal Time Learning in Intelligent Systems</a:t>
-            </a:r>
-          </a:p>
-        </p:txBody>
-      </p:sp>
-      <p:sp>
-        <p:nvSpPr>
-          <p:cNvPr id="8" name="Shape 46"/>
-          <p:cNvSpPr txBox="1"/>
-          <p:nvPr/>
-        </p:nvSpPr>
-        <p:spPr>
-          <a:xfrm>
-            <a:off x="355600" y="9131343"/>
-            <a:ext cx="600892" cy="379591"/>
-          </a:xfrm>
-          <a:prstGeom prst="rect">
-            <a:avLst/>
-          </a:prstGeom>
-          <a:noFill/>
-          <a:ln>
-            <a:noFill/>
-          </a:ln>
-        </p:spPr>
-        <p:txBody>
-          <a:bodyPr lIns="50800" tIns="50800" rIns="50800" bIns="50800" anchor="ctr" anchorCtr="0">
-            <a:noAutofit/>
-          </a:bodyPr>
-          <a:lstStyle/>
-          <a:p>
-            <a:pPr marL="0" marR="0" lvl="0" indent="0" algn="ctr" rtl="0">
-              <a:lnSpc>
-                <a:spcPct val="100000"/>
-              </a:lnSpc>
-              <a:spcBef>
-                <a:spcPts val="0"/>
-              </a:spcBef>
-              <a:spcAft>
-                <a:spcPts val="0"/>
-              </a:spcAft>
-              <a:buClr>
-                <a:srgbClr val="535353"/>
-              </a:buClr>
-              <a:buSzPct val="25000"/>
-              <a:buFont typeface="Gill Sans"/>
-              <a:buNone/>
-            </a:pPr>
-            <a:r>
-              <a:rPr lang="en-GB" sz="1800" b="0" i="0" u="none" strike="noStrike" cap="none" dirty="0">
-                <a:solidFill>
-                  <a:srgbClr val="535353"/>
-                </a:solidFill>
-                <a:latin typeface="Gill Sans"/>
-                <a:ea typeface="Gill Sans"/>
-                <a:cs typeface="Gill Sans"/>
-                <a:sym typeface="Gill Sans"/>
-              </a:rPr>
-              <a:t>7</a:t>
-            </a:r>
-          </a:p>
-        </p:txBody>
-      </p:sp>
-    </p:spTree>
-    <p:extLst>
-      <p:ext uri="{BB962C8B-B14F-4D97-AF65-F5344CB8AC3E}">
-        <p14:creationId xmlns:p14="http://schemas.microsoft.com/office/powerpoint/2010/main" val="2077982213"/>
       </p:ext>
     </p:extLst>
   </p:cSld>
@@ -6981,13 +7788,328 @@
             </a:pPr>
             <a:r>
               <a:rPr lang="en-GB" sz="5400" dirty="0"/>
-              <a:t>LASVM</a:t>
+              <a:t>Support Vector Machines - Results</a:t>
             </a:r>
           </a:p>
         </p:txBody>
       </p:sp>
-      <mc:AlternateContent xmlns:mc="http://schemas.openxmlformats.org/markup-compatibility/2006">
-        <mc:Choice xmlns:a14="http://schemas.microsoft.com/office/drawing/2010/main" Requires="a14">
+      <p:sp>
+        <p:nvSpPr>
+          <p:cNvPr id="5" name="Shape 44"/>
+          <p:cNvSpPr txBox="1">
+            <a:spLocks noGrp="1"/>
+          </p:cNvSpPr>
+          <p:nvPr>
+            <p:ph type="body" idx="1"/>
+          </p:nvPr>
+        </p:nvSpPr>
+        <p:spPr>
+          <a:xfrm>
+            <a:off x="355600" y="2730500"/>
+            <a:ext cx="12293599" cy="6299200"/>
+          </a:xfrm>
+          <a:prstGeom prst="rect">
+            <a:avLst/>
+          </a:prstGeom>
+          <a:noFill/>
+          <a:ln>
+            <a:noFill/>
+          </a:ln>
+        </p:spPr>
+        <p:txBody>
+          <a:bodyPr lIns="0" tIns="0" rIns="0" bIns="0" anchor="t" anchorCtr="0">
+            <a:noAutofit/>
+          </a:bodyPr>
+          <a:lstStyle/>
+          <a:p>
+            <a:pPr marL="1071562" marR="0" lvl="0" indent="-538162" algn="just" rtl="0">
+              <a:lnSpc>
+                <a:spcPct val="100000"/>
+              </a:lnSpc>
+              <a:spcBef>
+                <a:spcPts val="3700"/>
+              </a:spcBef>
+              <a:buSzPct val="98157"/>
+              <a:buFont typeface="Arial"/>
+              <a:buChar char="•"/>
+            </a:pPr>
+            <a:r>
+              <a:rPr lang="en-GB" dirty="0"/>
+              <a:t>Average AUC of 0.74 in test dataset</a:t>
+            </a:r>
+          </a:p>
+          <a:p>
+            <a:pPr marL="1071562" lvl="0" indent="-538162" algn="just">
+              <a:spcBef>
+                <a:spcPts val="3700"/>
+              </a:spcBef>
+              <a:buSzPct val="98157"/>
+              <a:buFont typeface="Arial"/>
+              <a:buChar char="•"/>
+            </a:pPr>
+            <a:r>
+              <a:rPr lang="en-GB" dirty="0"/>
+              <a:t>Best AUC = 0.99 for family “b.29.1._b.29.1.2.” (C = 256 ; </a:t>
+            </a:r>
+            <a:r>
+              <a:rPr lang="el-GR" dirty="0"/>
+              <a:t>γ</a:t>
+            </a:r>
+            <a:r>
+              <a:rPr lang="pt-PT" dirty="0"/>
+              <a:t> = 3.9e-03)</a:t>
+            </a:r>
+            <a:endParaRPr lang="en-GB" dirty="0"/>
+          </a:p>
+          <a:p>
+            <a:pPr marL="1071562" lvl="0" indent="-538162" algn="just">
+              <a:spcBef>
+                <a:spcPts val="3700"/>
+              </a:spcBef>
+              <a:buSzPct val="98157"/>
+              <a:buFont typeface="Arial"/>
+              <a:buChar char="•"/>
+            </a:pPr>
+            <a:r>
+              <a:rPr lang="en-GB" dirty="0"/>
+              <a:t>Overfitting in families “c.26.2._c.26.2.1.” and “c.47.1._c.47.1.10.” (Train AUC = 1; Test AUC around 0.5)</a:t>
+            </a:r>
+          </a:p>
+          <a:p>
+            <a:pPr marL="1071562" lvl="0" indent="-538162" algn="just">
+              <a:spcBef>
+                <a:spcPts val="3700"/>
+              </a:spcBef>
+              <a:buSzPct val="98157"/>
+              <a:buFont typeface="Arial"/>
+              <a:buChar char="•"/>
+            </a:pPr>
+            <a:r>
+              <a:rPr lang="en-GB" dirty="0"/>
+              <a:t>Families where no classifier could be learned (Train AUC = Test AUC around 0.5)</a:t>
+            </a:r>
+            <a:endParaRPr lang="pt-PT" dirty="0"/>
+          </a:p>
+        </p:txBody>
+      </p:sp>
+      <p:pic>
+        <p:nvPicPr>
+          <p:cNvPr id="6" name="Shape 45"/>
+          <p:cNvPicPr preferRelativeResize="0"/>
+          <p:nvPr/>
+        </p:nvPicPr>
+        <p:blipFill rotWithShape="1">
+          <a:blip r:embed="rId3">
+            <a:alphaModFix/>
+          </a:blip>
+          <a:srcRect/>
+          <a:stretch/>
+        </p:blipFill>
+        <p:spPr>
+          <a:xfrm>
+            <a:off x="10566400" y="8579242"/>
+            <a:ext cx="2082800" cy="900915"/>
+          </a:xfrm>
+          <a:prstGeom prst="rect">
+            <a:avLst/>
+          </a:prstGeom>
+          <a:noFill/>
+          <a:ln>
+            <a:noFill/>
+          </a:ln>
+        </p:spPr>
+      </p:pic>
+      <p:sp>
+        <p:nvSpPr>
+          <p:cNvPr id="7" name="Shape 47"/>
+          <p:cNvSpPr txBox="1"/>
+          <p:nvPr/>
+        </p:nvSpPr>
+        <p:spPr>
+          <a:xfrm>
+            <a:off x="3874426" y="9131350"/>
+            <a:ext cx="5623800" cy="379500"/>
+          </a:xfrm>
+          <a:prstGeom prst="rect">
+            <a:avLst/>
+          </a:prstGeom>
+          <a:noFill/>
+          <a:ln>
+            <a:noFill/>
+          </a:ln>
+        </p:spPr>
+        <p:txBody>
+          <a:bodyPr lIns="50800" tIns="50800" rIns="50800" bIns="50800" anchor="ctr" anchorCtr="0">
+            <a:noAutofit/>
+          </a:bodyPr>
+          <a:lstStyle/>
+          <a:p>
+            <a:pPr marL="0" marR="0" lvl="0" indent="0" algn="ctr" rtl="0">
+              <a:spcBef>
+                <a:spcPts val="0"/>
+              </a:spcBef>
+              <a:buSzPct val="25000"/>
+              <a:buNone/>
+            </a:pPr>
+            <a:r>
+              <a:rPr lang="en-GB" sz="1800" b="0" i="0" u="none" strike="noStrike" cap="none" dirty="0">
+                <a:solidFill>
+                  <a:srgbClr val="535353"/>
+                </a:solidFill>
+                <a:latin typeface="Gill Sans"/>
+                <a:ea typeface="Gill Sans"/>
+                <a:cs typeface="Gill Sans"/>
+                <a:sym typeface="Gill Sans"/>
+              </a:rPr>
+              <a:t>Joaquim Leitão – R</a:t>
+            </a:r>
+            <a:r>
+              <a:rPr lang="en-GB" sz="1800" dirty="0">
+                <a:solidFill>
+                  <a:srgbClr val="535353"/>
+                </a:solidFill>
+                <a:latin typeface="Gill Sans"/>
+                <a:ea typeface="Gill Sans"/>
+                <a:cs typeface="Gill Sans"/>
+                <a:sym typeface="Gill Sans"/>
+              </a:rPr>
+              <a:t>eal Time Learning in Intelligent Systems</a:t>
+            </a:r>
+          </a:p>
+        </p:txBody>
+      </p:sp>
+      <p:sp>
+        <p:nvSpPr>
+          <p:cNvPr id="8" name="Shape 46"/>
+          <p:cNvSpPr txBox="1"/>
+          <p:nvPr/>
+        </p:nvSpPr>
+        <p:spPr>
+          <a:xfrm>
+            <a:off x="355600" y="9131343"/>
+            <a:ext cx="600892" cy="379591"/>
+          </a:xfrm>
+          <a:prstGeom prst="rect">
+            <a:avLst/>
+          </a:prstGeom>
+          <a:noFill/>
+          <a:ln>
+            <a:noFill/>
+          </a:ln>
+        </p:spPr>
+        <p:txBody>
+          <a:bodyPr lIns="50800" tIns="50800" rIns="50800" bIns="50800" anchor="ctr" anchorCtr="0">
+            <a:noAutofit/>
+          </a:bodyPr>
+          <a:lstStyle/>
+          <a:p>
+            <a:pPr marL="0" marR="0" lvl="0" indent="0" algn="ctr" rtl="0">
+              <a:lnSpc>
+                <a:spcPct val="100000"/>
+              </a:lnSpc>
+              <a:spcBef>
+                <a:spcPts val="0"/>
+              </a:spcBef>
+              <a:spcAft>
+                <a:spcPts val="0"/>
+              </a:spcAft>
+              <a:buClr>
+                <a:srgbClr val="535353"/>
+              </a:buClr>
+              <a:buSzPct val="25000"/>
+              <a:buFont typeface="Gill Sans"/>
+              <a:buNone/>
+            </a:pPr>
+            <a:r>
+              <a:rPr lang="en-GB" sz="1800" b="0" i="0" u="none" strike="noStrike" cap="none" dirty="0">
+                <a:solidFill>
+                  <a:srgbClr val="535353"/>
+                </a:solidFill>
+                <a:latin typeface="Gill Sans"/>
+                <a:ea typeface="Gill Sans"/>
+                <a:cs typeface="Gill Sans"/>
+                <a:sym typeface="Gill Sans"/>
+              </a:rPr>
+              <a:t>8</a:t>
+            </a:r>
+          </a:p>
+        </p:txBody>
+      </p:sp>
+    </p:spTree>
+    <p:extLst>
+      <p:ext uri="{BB962C8B-B14F-4D97-AF65-F5344CB8AC3E}">
+        <p14:creationId xmlns:p14="http://schemas.microsoft.com/office/powerpoint/2010/main" val="2077982213"/>
+      </p:ext>
+    </p:extLst>
+  </p:cSld>
+  <p:clrMapOvr>
+    <a:masterClrMapping/>
+  </p:clrMapOvr>
+</p:sld>
+</file>
+
+<file path=ppt/slides/slide9.xml><?xml version="1.0" encoding="utf-8"?>
+<p:sld xmlns:a="http://schemas.openxmlformats.org/drawingml/2006/main" xmlns:r="http://schemas.openxmlformats.org/officeDocument/2006/relationships" xmlns:p="http://schemas.openxmlformats.org/presentationml/2006/main">
+  <p:cSld>
+    <p:spTree>
+      <p:nvGrpSpPr>
+        <p:cNvPr id="1" name=""/>
+        <p:cNvGrpSpPr/>
+        <p:nvPr/>
+      </p:nvGrpSpPr>
+      <p:grpSpPr>
+        <a:xfrm>
+          <a:off x="0" y="0"/>
+          <a:ext cx="0" cy="0"/>
+          <a:chOff x="0" y="0"/>
+          <a:chExt cx="0" cy="0"/>
+        </a:xfrm>
+      </p:grpSpPr>
+      <p:sp>
+        <p:nvSpPr>
+          <p:cNvPr id="4" name="Shape 43"/>
+          <p:cNvSpPr txBox="1">
+            <a:spLocks noGrp="1"/>
+          </p:cNvSpPr>
+          <p:nvPr>
+            <p:ph type="title"/>
+          </p:nvPr>
+        </p:nvSpPr>
+        <p:spPr>
+          <a:xfrm>
+            <a:off x="355600" y="150125"/>
+            <a:ext cx="12293599" cy="1928125"/>
+          </a:xfrm>
+          <a:prstGeom prst="rect">
+            <a:avLst/>
+          </a:prstGeom>
+          <a:noFill/>
+          <a:ln>
+            <a:noFill/>
+          </a:ln>
+        </p:spPr>
+        <p:txBody>
+          <a:bodyPr lIns="0" tIns="0" rIns="0" bIns="0" anchor="ctr" anchorCtr="0">
+            <a:noAutofit/>
+          </a:bodyPr>
+          <a:lstStyle/>
+          <a:p>
+            <a:pPr marL="0" marR="0" lvl="0" indent="0" algn="ctr" rtl="0">
+              <a:spcBef>
+                <a:spcPts val="0"/>
+              </a:spcBef>
+              <a:buSzPct val="25000"/>
+              <a:buNone/>
+            </a:pPr>
+            <a:r>
+              <a:rPr lang="en-GB" sz="5400" dirty="0"/>
+              <a:t>LASVM</a:t>
+            </a:r>
+          </a:p>
+        </p:txBody>
+      </p:sp>
+      <mc:AlternateContent xmlns:mc="http://schemas.openxmlformats.org/markup-compatibility/2006" xmlns:a14="http://schemas.microsoft.com/office/drawing/2010/main">
+        <mc:Choice Requires="a14">
           <p:sp>
             <p:nvSpPr>
               <p:cNvPr id="5" name="Shape 44"/>
@@ -7098,10 +8220,10 @@
                       </m:sSupPr>
                       <m:e>
                         <m:r>
-                          <a:rPr lang="pt-PT" sz="3600" i="1">
+                          <a:rPr lang="pt-PT" sz="3600" b="0" i="1" smtClean="0">
                             <a:latin typeface="Cambria Math" panose="02040503050406030204" pitchFamily="18" charset="0"/>
                           </a:rPr>
-                          <m:t>10</m:t>
+                          <m:t>2</m:t>
                         </m:r>
                       </m:e>
                       <m:sup>
@@ -7109,7 +8231,13 @@
                           <a:rPr lang="pt-PT" sz="3600" i="1">
                             <a:latin typeface="Cambria Math" panose="02040503050406030204" pitchFamily="18" charset="0"/>
                           </a:rPr>
-                          <m:t>−3</m:t>
+                          <m:t>−</m:t>
+                        </m:r>
+                        <m:r>
+                          <a:rPr lang="pt-PT" sz="3600" b="0" i="1" smtClean="0">
+                            <a:latin typeface="Cambria Math" panose="02040503050406030204" pitchFamily="18" charset="0"/>
+                          </a:rPr>
+                          <m:t>5</m:t>
                         </m:r>
                       </m:sup>
                     </m:sSup>
@@ -7129,10 +8257,10 @@
                       </m:sSupPr>
                       <m:e>
                         <m:r>
-                          <a:rPr lang="pt-PT" sz="3600" i="1">
+                          <a:rPr lang="pt-PT" sz="3600" b="0" i="1" smtClean="0">
                             <a:latin typeface="Cambria Math" panose="02040503050406030204" pitchFamily="18" charset="0"/>
                           </a:rPr>
-                          <m:t>10</m:t>
+                          <m:t>2</m:t>
                         </m:r>
                       </m:e>
                       <m:sup>
@@ -7140,7 +8268,13 @@
                           <a:rPr lang="pt-PT" sz="3600" i="1">
                             <a:latin typeface="Cambria Math" panose="02040503050406030204" pitchFamily="18" charset="0"/>
                           </a:rPr>
-                          <m:t>−2</m:t>
+                          <m:t>−</m:t>
+                        </m:r>
+                        <m:r>
+                          <a:rPr lang="pt-PT" sz="3600" b="0" i="1" smtClean="0">
+                            <a:latin typeface="Cambria Math" panose="02040503050406030204" pitchFamily="18" charset="0"/>
+                          </a:rPr>
+                          <m:t>4</m:t>
                         </m:r>
                       </m:sup>
                     </m:sSup>
@@ -7160,18 +8294,18 @@
                       </m:sSupPr>
                       <m:e>
                         <m:r>
-                          <a:rPr lang="pt-PT" sz="3600" i="1">
+                          <a:rPr lang="pt-PT" sz="3600" b="0" i="1" smtClean="0">
                             <a:latin typeface="Cambria Math" panose="02040503050406030204" pitchFamily="18" charset="0"/>
                           </a:rPr>
-                          <m:t>10</m:t>
+                          <m:t>2</m:t>
                         </m:r>
                       </m:e>
                       <m:sup>
                         <m:r>
-                          <a:rPr lang="pt-PT" sz="3600" i="1">
+                          <a:rPr lang="pt-PT" sz="3600" b="0" i="1" smtClean="0">
                             <a:latin typeface="Cambria Math" panose="02040503050406030204" pitchFamily="18" charset="0"/>
                           </a:rPr>
-                          <m:t>3</m:t>
+                          <m:t>15</m:t>
                         </m:r>
                       </m:sup>
                     </m:sSup>
@@ -7208,10 +8342,10 @@
                       </m:sSupPr>
                       <m:e>
                         <m:r>
-                          <a:rPr lang="pt-PT" sz="3600" i="1">
+                          <a:rPr lang="pt-PT" sz="3600" b="0" i="1" smtClean="0">
                             <a:latin typeface="Cambria Math" panose="02040503050406030204" pitchFamily="18" charset="0"/>
                           </a:rPr>
-                          <m:t>10</m:t>
+                          <m:t>2</m:t>
                         </m:r>
                       </m:e>
                       <m:sup>
@@ -7219,7 +8353,13 @@
                           <a:rPr lang="pt-PT" sz="3600" i="1">
                             <a:latin typeface="Cambria Math" panose="02040503050406030204" pitchFamily="18" charset="0"/>
                           </a:rPr>
-                          <m:t>−4</m:t>
+                          <m:t>−</m:t>
+                        </m:r>
+                        <m:r>
+                          <a:rPr lang="pt-PT" sz="3600" b="0" i="1" smtClean="0">
+                            <a:latin typeface="Cambria Math" panose="02040503050406030204" pitchFamily="18" charset="0"/>
+                          </a:rPr>
+                          <m:t>15</m:t>
                         </m:r>
                       </m:sup>
                     </m:sSup>
@@ -7239,10 +8379,10 @@
                       </m:sSupPr>
                       <m:e>
                         <m:r>
-                          <a:rPr lang="pt-PT" sz="3600" i="1">
+                          <a:rPr lang="pt-PT" sz="3600" b="0" i="1" smtClean="0">
                             <a:latin typeface="Cambria Math" panose="02040503050406030204" pitchFamily="18" charset="0"/>
                           </a:rPr>
-                          <m:t>10</m:t>
+                          <m:t>2</m:t>
                         </m:r>
                       </m:e>
                       <m:sup>
@@ -7250,7 +8390,13 @@
                           <a:rPr lang="pt-PT" sz="3600" i="1">
                             <a:latin typeface="Cambria Math" panose="02040503050406030204" pitchFamily="18" charset="0"/>
                           </a:rPr>
-                          <m:t>−3</m:t>
+                          <m:t>−</m:t>
+                        </m:r>
+                        <m:r>
+                          <a:rPr lang="pt-PT" sz="3600" b="0" i="1" smtClean="0">
+                            <a:latin typeface="Cambria Math" panose="02040503050406030204" pitchFamily="18" charset="0"/>
+                          </a:rPr>
+                          <m:t>14</m:t>
                         </m:r>
                       </m:sup>
                     </m:sSup>
@@ -7270,18 +8416,18 @@
                       </m:sSupPr>
                       <m:e>
                         <m:r>
-                          <a:rPr lang="pt-PT" sz="3600" i="1">
+                          <a:rPr lang="pt-PT" sz="3600" b="0" i="1" smtClean="0">
                             <a:latin typeface="Cambria Math" panose="02040503050406030204" pitchFamily="18" charset="0"/>
                           </a:rPr>
-                          <m:t>10</m:t>
+                          <m:t>2</m:t>
                         </m:r>
                       </m:e>
                       <m:sup>
                         <m:r>
-                          <a:rPr lang="pt-PT" sz="3600" i="1">
+                          <a:rPr lang="pt-PT" sz="3600" b="0" i="1" smtClean="0">
                             <a:latin typeface="Cambria Math" panose="02040503050406030204" pitchFamily="18" charset="0"/>
                           </a:rPr>
-                          <m:t>4</m:t>
+                          <m:t>15</m:t>
                         </m:r>
                       </m:sup>
                     </m:sSup>
@@ -7306,7 +8452,7 @@
             </p:txBody>
           </p:sp>
         </mc:Choice>
-        <mc:Fallback>
+        <mc:Fallback xmlns="">
           <p:sp>
             <p:nvSpPr>
               <p:cNvPr id="5" name="Shape 44"/>
@@ -7479,342 +8625,6 @@
               <a:buNone/>
             </a:pPr>
             <a:r>
-              <a:rPr lang="en-GB" sz="1800" b="0" i="0" u="none" strike="noStrike" cap="none" dirty="0">
-                <a:solidFill>
-                  <a:srgbClr val="535353"/>
-                </a:solidFill>
-                <a:latin typeface="Gill Sans"/>
-                <a:ea typeface="Gill Sans"/>
-                <a:cs typeface="Gill Sans"/>
-                <a:sym typeface="Gill Sans"/>
-              </a:rPr>
-              <a:t>8</a:t>
-            </a:r>
-          </a:p>
-        </p:txBody>
-      </p:sp>
-    </p:spTree>
-    <p:extLst>
-      <p:ext uri="{BB962C8B-B14F-4D97-AF65-F5344CB8AC3E}">
-        <p14:creationId xmlns:p14="http://schemas.microsoft.com/office/powerpoint/2010/main" val="2221614257"/>
-      </p:ext>
-    </p:extLst>
-  </p:cSld>
-  <p:clrMapOvr>
-    <a:masterClrMapping/>
-  </p:clrMapOvr>
-</p:sld>
-</file>
-
-<file path=ppt/slides/slide9.xml><?xml version="1.0" encoding="utf-8"?>
-<p:sld xmlns:a="http://schemas.openxmlformats.org/drawingml/2006/main" xmlns:r="http://schemas.openxmlformats.org/officeDocument/2006/relationships" xmlns:p="http://schemas.openxmlformats.org/presentationml/2006/main">
-  <p:cSld>
-    <p:spTree>
-      <p:nvGrpSpPr>
-        <p:cNvPr id="1" name=""/>
-        <p:cNvGrpSpPr/>
-        <p:nvPr/>
-      </p:nvGrpSpPr>
-      <p:grpSpPr>
-        <a:xfrm>
-          <a:off x="0" y="0"/>
-          <a:ext cx="0" cy="0"/>
-          <a:chOff x="0" y="0"/>
-          <a:chExt cx="0" cy="0"/>
-        </a:xfrm>
-      </p:grpSpPr>
-      <p:sp>
-        <p:nvSpPr>
-          <p:cNvPr id="4" name="Shape 43"/>
-          <p:cNvSpPr txBox="1">
-            <a:spLocks noGrp="1"/>
-          </p:cNvSpPr>
-          <p:nvPr>
-            <p:ph type="title"/>
-          </p:nvPr>
-        </p:nvSpPr>
-        <p:spPr>
-          <a:xfrm>
-            <a:off x="355600" y="150125"/>
-            <a:ext cx="12293599" cy="1928125"/>
-          </a:xfrm>
-          <a:prstGeom prst="rect">
-            <a:avLst/>
-          </a:prstGeom>
-          <a:noFill/>
-          <a:ln>
-            <a:noFill/>
-          </a:ln>
-        </p:spPr>
-        <p:txBody>
-          <a:bodyPr lIns="0" tIns="0" rIns="0" bIns="0" anchor="ctr" anchorCtr="0">
-            <a:noAutofit/>
-          </a:bodyPr>
-          <a:lstStyle/>
-          <a:p>
-            <a:pPr marL="0" marR="0" lvl="0" indent="0" algn="ctr" rtl="0">
-              <a:spcBef>
-                <a:spcPts val="0"/>
-              </a:spcBef>
-              <a:buSzPct val="25000"/>
-              <a:buNone/>
-            </a:pPr>
-            <a:r>
-              <a:rPr lang="en-GB" sz="5400" dirty="0"/>
-              <a:t>LASVM - Results</a:t>
-            </a:r>
-          </a:p>
-        </p:txBody>
-      </p:sp>
-      <p:sp>
-        <p:nvSpPr>
-          <p:cNvPr id="5" name="Shape 44"/>
-          <p:cNvSpPr txBox="1">
-            <a:spLocks noGrp="1"/>
-          </p:cNvSpPr>
-          <p:nvPr>
-            <p:ph type="body" idx="1"/>
-          </p:nvPr>
-        </p:nvSpPr>
-        <p:spPr>
-          <a:xfrm>
-            <a:off x="355600" y="2730500"/>
-            <a:ext cx="12293599" cy="6299200"/>
-          </a:xfrm>
-          <a:prstGeom prst="rect">
-            <a:avLst/>
-          </a:prstGeom>
-          <a:noFill/>
-          <a:ln>
-            <a:noFill/>
-          </a:ln>
-        </p:spPr>
-        <p:txBody>
-          <a:bodyPr lIns="0" tIns="0" rIns="0" bIns="0" anchor="t" anchorCtr="0">
-            <a:noAutofit/>
-          </a:bodyPr>
-          <a:lstStyle/>
-          <a:p>
-            <a:pPr marL="1071562" lvl="0" indent="-538162" algn="just">
-              <a:spcBef>
-                <a:spcPts val="3700"/>
-              </a:spcBef>
-              <a:buSzPct val="98157"/>
-              <a:buFont typeface="Arial"/>
-              <a:buChar char="•"/>
-            </a:pPr>
-            <a:r>
-              <a:rPr lang="en-GB" dirty="0"/>
-              <a:t>Average AUC of 0.81 in test dataset</a:t>
-            </a:r>
-          </a:p>
-          <a:p>
-            <a:pPr marL="1071562" lvl="0" indent="-538162" algn="just">
-              <a:spcBef>
-                <a:spcPts val="3700"/>
-              </a:spcBef>
-              <a:buSzPct val="98157"/>
-              <a:buFont typeface="Arial"/>
-              <a:buChar char="•"/>
-            </a:pPr>
-            <a:r>
-              <a:rPr lang="en-GB" dirty="0"/>
-              <a:t>Best AUC = 0.99 in families “b.29.1._b.29.1.11.” (C = 32 ;</a:t>
-            </a:r>
-            <a:r>
-              <a:rPr lang="el-GR" dirty="0"/>
-              <a:t> γ</a:t>
-            </a:r>
-            <a:r>
-              <a:rPr lang="pt-PT" dirty="0"/>
-              <a:t> = 1.22e-04</a:t>
-            </a:r>
-            <a:r>
-              <a:rPr lang="en-GB" dirty="0"/>
-              <a:t>); “b.29.1._b.29.1.2.” (C = 4 ; </a:t>
-            </a:r>
-            <a:r>
-              <a:rPr lang="el-GR" dirty="0"/>
-              <a:t>γ</a:t>
-            </a:r>
-            <a:r>
-              <a:rPr lang="pt-PT" dirty="0"/>
-              <a:t> = 9.7e-04); </a:t>
-            </a:r>
-            <a:r>
-              <a:rPr lang="en-GB" dirty="0"/>
-              <a:t>and “c.67.1._c.67.1.4.” (C = 512 ; </a:t>
-            </a:r>
-            <a:r>
-              <a:rPr lang="el-GR" dirty="0"/>
-              <a:t>γ</a:t>
-            </a:r>
-            <a:r>
-              <a:rPr lang="pt-PT" dirty="0"/>
-              <a:t> = 2.44e-04)</a:t>
-            </a:r>
-            <a:endParaRPr lang="en-GB" dirty="0"/>
-          </a:p>
-          <a:p>
-            <a:pPr marL="1071562" lvl="0" indent="-538162" algn="just">
-              <a:spcBef>
-                <a:spcPts val="3700"/>
-              </a:spcBef>
-              <a:buSzPct val="98157"/>
-              <a:buFont typeface="Arial"/>
-              <a:buChar char="•"/>
-            </a:pPr>
-            <a:r>
-              <a:rPr lang="en-GB" dirty="0"/>
-              <a:t>Does not appear to suffer from overfitting</a:t>
-            </a:r>
-          </a:p>
-          <a:p>
-            <a:pPr marL="1071562" lvl="0" indent="-538162" algn="just">
-              <a:spcBef>
-                <a:spcPts val="3700"/>
-              </a:spcBef>
-              <a:buSzPct val="98157"/>
-              <a:buFont typeface="Arial"/>
-              <a:buChar char="•"/>
-            </a:pPr>
-            <a:r>
-              <a:rPr lang="en-GB" dirty="0"/>
-              <a:t>Families where no classifier could be learned (Train AUC = Test AUC around 0.5)</a:t>
-            </a:r>
-            <a:endParaRPr lang="pt-PT" dirty="0"/>
-          </a:p>
-        </p:txBody>
-      </p:sp>
-      <p:pic>
-        <p:nvPicPr>
-          <p:cNvPr id="6" name="Shape 45"/>
-          <p:cNvPicPr preferRelativeResize="0"/>
-          <p:nvPr/>
-        </p:nvPicPr>
-        <p:blipFill rotWithShape="1">
-          <a:blip r:embed="rId3">
-            <a:alphaModFix/>
-          </a:blip>
-          <a:srcRect/>
-          <a:stretch/>
-        </p:blipFill>
-        <p:spPr>
-          <a:xfrm>
-            <a:off x="10566400" y="8579242"/>
-            <a:ext cx="2082800" cy="900915"/>
-          </a:xfrm>
-          <a:prstGeom prst="rect">
-            <a:avLst/>
-          </a:prstGeom>
-          <a:noFill/>
-          <a:ln>
-            <a:noFill/>
-          </a:ln>
-        </p:spPr>
-      </p:pic>
-      <p:sp>
-        <p:nvSpPr>
-          <p:cNvPr id="7" name="Shape 47"/>
-          <p:cNvSpPr txBox="1"/>
-          <p:nvPr/>
-        </p:nvSpPr>
-        <p:spPr>
-          <a:xfrm>
-            <a:off x="3874426" y="9131350"/>
-            <a:ext cx="5623800" cy="379500"/>
-          </a:xfrm>
-          <a:prstGeom prst="rect">
-            <a:avLst/>
-          </a:prstGeom>
-          <a:noFill/>
-          <a:ln>
-            <a:noFill/>
-          </a:ln>
-        </p:spPr>
-        <p:txBody>
-          <a:bodyPr lIns="50800" tIns="50800" rIns="50800" bIns="50800" anchor="ctr" anchorCtr="0">
-            <a:noAutofit/>
-          </a:bodyPr>
-          <a:lstStyle/>
-          <a:p>
-            <a:pPr marL="0" marR="0" lvl="0" indent="0" algn="ctr" rtl="0">
-              <a:spcBef>
-                <a:spcPts val="0"/>
-              </a:spcBef>
-              <a:buSzPct val="25000"/>
-              <a:buNone/>
-            </a:pPr>
-            <a:r>
-              <a:rPr lang="en-GB" sz="1800" b="0" i="0" u="none" strike="noStrike" cap="none" dirty="0">
-                <a:solidFill>
-                  <a:srgbClr val="535353"/>
-                </a:solidFill>
-                <a:latin typeface="Gill Sans"/>
-                <a:ea typeface="Gill Sans"/>
-                <a:cs typeface="Gill Sans"/>
-                <a:sym typeface="Gill Sans"/>
-              </a:rPr>
-              <a:t>Joaquim Leitão – R</a:t>
-            </a:r>
-            <a:r>
-              <a:rPr lang="en-GB" sz="1800" dirty="0">
-                <a:solidFill>
-                  <a:srgbClr val="535353"/>
-                </a:solidFill>
-                <a:latin typeface="Gill Sans"/>
-                <a:ea typeface="Gill Sans"/>
-                <a:cs typeface="Gill Sans"/>
-                <a:sym typeface="Gill Sans"/>
-              </a:rPr>
-              <a:t>eal Time Learning in Intelligent Systems</a:t>
-            </a:r>
-          </a:p>
-        </p:txBody>
-      </p:sp>
-      <p:sp>
-        <p:nvSpPr>
-          <p:cNvPr id="8" name="Shape 46"/>
-          <p:cNvSpPr txBox="1"/>
-          <p:nvPr/>
-        </p:nvSpPr>
-        <p:spPr>
-          <a:xfrm>
-            <a:off x="355600" y="9131343"/>
-            <a:ext cx="600892" cy="379591"/>
-          </a:xfrm>
-          <a:prstGeom prst="rect">
-            <a:avLst/>
-          </a:prstGeom>
-          <a:noFill/>
-          <a:ln>
-            <a:noFill/>
-          </a:ln>
-        </p:spPr>
-        <p:txBody>
-          <a:bodyPr lIns="50800" tIns="50800" rIns="50800" bIns="50800" anchor="ctr" anchorCtr="0">
-            <a:noAutofit/>
-          </a:bodyPr>
-          <a:lstStyle/>
-          <a:p>
-            <a:pPr marL="0" marR="0" lvl="0" indent="0" algn="ctr" rtl="0">
-              <a:lnSpc>
-                <a:spcPct val="100000"/>
-              </a:lnSpc>
-              <a:spcBef>
-                <a:spcPts val="0"/>
-              </a:spcBef>
-              <a:spcAft>
-                <a:spcPts val="0"/>
-              </a:spcAft>
-              <a:buClr>
-                <a:srgbClr val="535353"/>
-              </a:buClr>
-              <a:buSzPct val="25000"/>
-              <a:buFont typeface="Gill Sans"/>
-              <a:buNone/>
-            </a:pPr>
-            <a:r>
               <a:rPr lang="en-GB" sz="1800" dirty="0">
                 <a:solidFill>
                   <a:srgbClr val="535353"/>
@@ -7841,7 +8651,7 @@
     </p:spTree>
     <p:extLst>
       <p:ext uri="{BB962C8B-B14F-4D97-AF65-F5344CB8AC3E}">
-        <p14:creationId xmlns:p14="http://schemas.microsoft.com/office/powerpoint/2010/main" val="4003849053"/>
+        <p14:creationId xmlns:p14="http://schemas.microsoft.com/office/powerpoint/2010/main" val="2221614257"/>
       </p:ext>
     </p:extLst>
   </p:cSld>

</xml_diff>